<commit_message>
added exercises to see
</commit_message>
<xml_diff>
--- a/slides/14-LinkedLists.pptx
+++ b/slides/14-LinkedLists.pptx
@@ -12,8 +12,10 @@
     <p:sldId id="259" r:id="rId6"/>
     <p:sldId id="260" r:id="rId7"/>
     <p:sldId id="261" r:id="rId8"/>
-    <p:sldId id="263" r:id="rId9"/>
-    <p:sldId id="265" r:id="rId10"/>
+    <p:sldId id="266" r:id="rId9"/>
+    <p:sldId id="263" r:id="rId10"/>
+    <p:sldId id="265" r:id="rId11"/>
+    <p:sldId id="267" r:id="rId12"/>
   </p:sldIdLst>
   <p:sldSz cx="12192000" cy="6858000"/>
   <p:notesSz cx="6858000" cy="9144000"/>
@@ -251,7 +253,7 @@
           <a:p>
             <a:fld id="{0D8D7A85-C680-4D97-8E7A-1E039B1638C1}" type="datetimeFigureOut">
               <a:rPr lang="en-US" smtClean="0"/>
-              <a:t>10/25/2023</a:t>
+              <a:t>10/26/2023</a:t>
             </a:fld>
             <a:endParaRPr lang="en-US"/>
           </a:p>
@@ -421,7 +423,7 @@
           <a:p>
             <a:fld id="{0D8D7A85-C680-4D97-8E7A-1E039B1638C1}" type="datetimeFigureOut">
               <a:rPr lang="en-US" smtClean="0"/>
-              <a:t>10/25/2023</a:t>
+              <a:t>10/26/2023</a:t>
             </a:fld>
             <a:endParaRPr lang="en-US"/>
           </a:p>
@@ -601,7 +603,7 @@
           <a:p>
             <a:fld id="{0D8D7A85-C680-4D97-8E7A-1E039B1638C1}" type="datetimeFigureOut">
               <a:rPr lang="en-US" smtClean="0"/>
-              <a:t>10/25/2023</a:t>
+              <a:t>10/26/2023</a:t>
             </a:fld>
             <a:endParaRPr lang="en-US"/>
           </a:p>
@@ -771,7 +773,7 @@
           <a:p>
             <a:fld id="{0D8D7A85-C680-4D97-8E7A-1E039B1638C1}" type="datetimeFigureOut">
               <a:rPr lang="en-US" smtClean="0"/>
-              <a:t>10/25/2023</a:t>
+              <a:t>10/26/2023</a:t>
             </a:fld>
             <a:endParaRPr lang="en-US"/>
           </a:p>
@@ -1017,7 +1019,7 @@
           <a:p>
             <a:fld id="{0D8D7A85-C680-4D97-8E7A-1E039B1638C1}" type="datetimeFigureOut">
               <a:rPr lang="en-US" smtClean="0"/>
-              <a:t>10/25/2023</a:t>
+              <a:t>10/26/2023</a:t>
             </a:fld>
             <a:endParaRPr lang="en-US"/>
           </a:p>
@@ -1249,7 +1251,7 @@
           <a:p>
             <a:fld id="{0D8D7A85-C680-4D97-8E7A-1E039B1638C1}" type="datetimeFigureOut">
               <a:rPr lang="en-US" smtClean="0"/>
-              <a:t>10/25/2023</a:t>
+              <a:t>10/26/2023</a:t>
             </a:fld>
             <a:endParaRPr lang="en-US"/>
           </a:p>
@@ -1616,7 +1618,7 @@
           <a:p>
             <a:fld id="{0D8D7A85-C680-4D97-8E7A-1E039B1638C1}" type="datetimeFigureOut">
               <a:rPr lang="en-US" smtClean="0"/>
-              <a:t>10/25/2023</a:t>
+              <a:t>10/26/2023</a:t>
             </a:fld>
             <a:endParaRPr lang="en-US"/>
           </a:p>
@@ -1734,7 +1736,7 @@
           <a:p>
             <a:fld id="{0D8D7A85-C680-4D97-8E7A-1E039B1638C1}" type="datetimeFigureOut">
               <a:rPr lang="en-US" smtClean="0"/>
-              <a:t>10/25/2023</a:t>
+              <a:t>10/26/2023</a:t>
             </a:fld>
             <a:endParaRPr lang="en-US"/>
           </a:p>
@@ -1829,7 +1831,7 @@
           <a:p>
             <a:fld id="{0D8D7A85-C680-4D97-8E7A-1E039B1638C1}" type="datetimeFigureOut">
               <a:rPr lang="en-US" smtClean="0"/>
-              <a:t>10/25/2023</a:t>
+              <a:t>10/26/2023</a:t>
             </a:fld>
             <a:endParaRPr lang="en-US"/>
           </a:p>
@@ -2106,7 +2108,7 @@
           <a:p>
             <a:fld id="{0D8D7A85-C680-4D97-8E7A-1E039B1638C1}" type="datetimeFigureOut">
               <a:rPr lang="en-US" smtClean="0"/>
-              <a:t>10/25/2023</a:t>
+              <a:t>10/26/2023</a:t>
             </a:fld>
             <a:endParaRPr lang="en-US"/>
           </a:p>
@@ -2359,7 +2361,7 @@
           <a:p>
             <a:fld id="{0D8D7A85-C680-4D97-8E7A-1E039B1638C1}" type="datetimeFigureOut">
               <a:rPr lang="en-US" smtClean="0"/>
-              <a:t>10/25/2023</a:t>
+              <a:t>10/26/2023</a:t>
             </a:fld>
             <a:endParaRPr lang="en-US"/>
           </a:p>
@@ -2572,7 +2574,7 @@
           <a:p>
             <a:fld id="{0D8D7A85-C680-4D97-8E7A-1E039B1638C1}" type="datetimeFigureOut">
               <a:rPr lang="en-US" smtClean="0"/>
-              <a:t>10/25/2023</a:t>
+              <a:t>10/26/2023</a:t>
             </a:fld>
             <a:endParaRPr lang="en-US"/>
           </a:p>
@@ -3036,6 +3038,1010 @@
       </p:par>
     </p:tnLst>
   </p:timing>
+</p:sld>
+</file>
+
+<file path=ppt/slides/slide10.xml><?xml version="1.0" encoding="utf-8"?>
+<p:sld xmlns:a="http://schemas.openxmlformats.org/drawingml/2006/main" xmlns:r="http://schemas.openxmlformats.org/officeDocument/2006/relationships" xmlns:p="http://schemas.openxmlformats.org/presentationml/2006/main">
+  <p:cSld>
+    <p:spTree>
+      <p:nvGrpSpPr>
+        <p:cNvPr id="1" name=""/>
+        <p:cNvGrpSpPr/>
+        <p:nvPr/>
+      </p:nvGrpSpPr>
+      <p:grpSpPr>
+        <a:xfrm>
+          <a:off x="0" y="0"/>
+          <a:ext cx="0" cy="0"/>
+          <a:chOff x="0" y="0"/>
+          <a:chExt cx="0" cy="0"/>
+        </a:xfrm>
+      </p:grpSpPr>
+      <p:sp>
+        <p:nvSpPr>
+          <p:cNvPr id="2" name="Title 1"/>
+          <p:cNvSpPr>
+            <a:spLocks noGrp="1"/>
+          </p:cNvSpPr>
+          <p:nvPr>
+            <p:ph type="title"/>
+          </p:nvPr>
+        </p:nvSpPr>
+        <p:spPr/>
+        <p:txBody>
+          <a:bodyPr/>
+          <a:lstStyle/>
+          <a:p>
+            <a:r>
+              <a:rPr lang="en-US" dirty="0" smtClean="0"/>
+              <a:t>Deleting from a position in a linked list</a:t>
+            </a:r>
+            <a:endParaRPr lang="en-US" dirty="0"/>
+          </a:p>
+        </p:txBody>
+      </p:sp>
+      <p:sp>
+        <p:nvSpPr>
+          <p:cNvPr id="3" name="Content Placeholder 2"/>
+          <p:cNvSpPr>
+            <a:spLocks noGrp="1"/>
+          </p:cNvSpPr>
+          <p:nvPr>
+            <p:ph idx="1"/>
+          </p:nvPr>
+        </p:nvSpPr>
+        <p:spPr>
+          <a:xfrm>
+            <a:off x="507458" y="1397607"/>
+            <a:ext cx="11684542" cy="5956504"/>
+          </a:xfrm>
+        </p:spPr>
+        <p:txBody>
+          <a:bodyPr>
+            <a:noAutofit/>
+          </a:bodyPr>
+          <a:lstStyle/>
+          <a:p>
+            <a:pPr marL="0" indent="0">
+              <a:buNone/>
+            </a:pPr>
+            <a:r>
+              <a:rPr lang="en-US" sz="2000" dirty="0" err="1">
+                <a:latin typeface="Courier New" panose="02070309020205020404" pitchFamily="49" charset="0"/>
+                <a:cs typeface="Courier New" panose="02070309020205020404" pitchFamily="49" charset="0"/>
+              </a:rPr>
+              <a:t>struct</a:t>
+            </a:r>
+            <a:r>
+              <a:rPr lang="en-US" sz="2000" dirty="0">
+                <a:latin typeface="Courier New" panose="02070309020205020404" pitchFamily="49" charset="0"/>
+                <a:cs typeface="Courier New" panose="02070309020205020404" pitchFamily="49" charset="0"/>
+              </a:rPr>
+              <a:t> node * </a:t>
+            </a:r>
+            <a:r>
+              <a:rPr lang="en-US" sz="2000" dirty="0" err="1" smtClean="0">
+                <a:latin typeface="Courier New" panose="02070309020205020404" pitchFamily="49" charset="0"/>
+                <a:cs typeface="Courier New" panose="02070309020205020404" pitchFamily="49" charset="0"/>
+              </a:rPr>
+              <a:t>node_delete</a:t>
+            </a:r>
+            <a:r>
+              <a:rPr lang="en-US" sz="2000" dirty="0" smtClean="0">
+                <a:latin typeface="Courier New" panose="02070309020205020404" pitchFamily="49" charset="0"/>
+                <a:cs typeface="Courier New" panose="02070309020205020404" pitchFamily="49" charset="0"/>
+              </a:rPr>
+              <a:t>(</a:t>
+            </a:r>
+            <a:r>
+              <a:rPr lang="en-US" sz="2000" dirty="0" err="1" smtClean="0">
+                <a:latin typeface="Courier New" panose="02070309020205020404" pitchFamily="49" charset="0"/>
+                <a:cs typeface="Courier New" panose="02070309020205020404" pitchFamily="49" charset="0"/>
+              </a:rPr>
+              <a:t>struct</a:t>
+            </a:r>
+            <a:r>
+              <a:rPr lang="en-US" sz="2000" dirty="0" smtClean="0">
+                <a:latin typeface="Courier New" panose="02070309020205020404" pitchFamily="49" charset="0"/>
+                <a:cs typeface="Courier New" panose="02070309020205020404" pitchFamily="49" charset="0"/>
+              </a:rPr>
+              <a:t> </a:t>
+            </a:r>
+            <a:r>
+              <a:rPr lang="en-US" sz="2000" dirty="0">
+                <a:latin typeface="Courier New" panose="02070309020205020404" pitchFamily="49" charset="0"/>
+                <a:cs typeface="Courier New" panose="02070309020205020404" pitchFamily="49" charset="0"/>
+              </a:rPr>
+              <a:t>node * head, </a:t>
+            </a:r>
+            <a:r>
+              <a:rPr lang="en-US" sz="2000" dirty="0" err="1">
+                <a:latin typeface="Courier New" panose="02070309020205020404" pitchFamily="49" charset="0"/>
+                <a:cs typeface="Courier New" panose="02070309020205020404" pitchFamily="49" charset="0"/>
+              </a:rPr>
+              <a:t>int</a:t>
+            </a:r>
+            <a:r>
+              <a:rPr lang="en-US" sz="2000" dirty="0">
+                <a:latin typeface="Courier New" panose="02070309020205020404" pitchFamily="49" charset="0"/>
+                <a:cs typeface="Courier New" panose="02070309020205020404" pitchFamily="49" charset="0"/>
+              </a:rPr>
+              <a:t> </a:t>
+            </a:r>
+            <a:r>
+              <a:rPr lang="en-US" sz="2000" dirty="0" err="1" smtClean="0">
+                <a:latin typeface="Courier New" panose="02070309020205020404" pitchFamily="49" charset="0"/>
+                <a:cs typeface="Courier New" panose="02070309020205020404" pitchFamily="49" charset="0"/>
+              </a:rPr>
+              <a:t>pos</a:t>
+            </a:r>
+            <a:r>
+              <a:rPr lang="en-US" sz="2000" dirty="0" smtClean="0">
+                <a:latin typeface="Courier New" panose="02070309020205020404" pitchFamily="49" charset="0"/>
+                <a:cs typeface="Courier New" panose="02070309020205020404" pitchFamily="49" charset="0"/>
+              </a:rPr>
+              <a:t>){</a:t>
+            </a:r>
+            <a:endParaRPr lang="en-US" sz="2000" dirty="0">
+              <a:latin typeface="Courier New" panose="02070309020205020404" pitchFamily="49" charset="0"/>
+              <a:cs typeface="Courier New" panose="02070309020205020404" pitchFamily="49" charset="0"/>
+            </a:endParaRPr>
+          </a:p>
+          <a:p>
+            <a:pPr marL="0" indent="0">
+              <a:buNone/>
+            </a:pPr>
+            <a:r>
+              <a:rPr lang="en-US" sz="2000" dirty="0" smtClean="0">
+                <a:latin typeface="Courier New" panose="02070309020205020404" pitchFamily="49" charset="0"/>
+                <a:cs typeface="Courier New" panose="02070309020205020404" pitchFamily="49" charset="0"/>
+              </a:rPr>
+              <a:t>   </a:t>
+            </a:r>
+            <a:r>
+              <a:rPr lang="en-US" sz="2000" dirty="0" err="1" smtClean="0">
+                <a:latin typeface="Courier New" panose="02070309020205020404" pitchFamily="49" charset="0"/>
+                <a:cs typeface="Courier New" panose="02070309020205020404" pitchFamily="49" charset="0"/>
+              </a:rPr>
+              <a:t>struct</a:t>
+            </a:r>
+            <a:r>
+              <a:rPr lang="en-US" sz="2000" dirty="0" smtClean="0">
+                <a:latin typeface="Courier New" panose="02070309020205020404" pitchFamily="49" charset="0"/>
+                <a:cs typeface="Courier New" panose="02070309020205020404" pitchFamily="49" charset="0"/>
+              </a:rPr>
+              <a:t> </a:t>
+            </a:r>
+            <a:r>
+              <a:rPr lang="en-US" sz="2000" dirty="0">
+                <a:latin typeface="Courier New" panose="02070309020205020404" pitchFamily="49" charset="0"/>
+                <a:cs typeface="Courier New" panose="02070309020205020404" pitchFamily="49" charset="0"/>
+              </a:rPr>
+              <a:t>node * l, * p</a:t>
+            </a:r>
+            <a:r>
+              <a:rPr lang="en-US" sz="2000" dirty="0" smtClean="0">
+                <a:latin typeface="Courier New" panose="02070309020205020404" pitchFamily="49" charset="0"/>
+                <a:cs typeface="Courier New" panose="02070309020205020404" pitchFamily="49" charset="0"/>
+              </a:rPr>
+              <a:t>;    </a:t>
+            </a:r>
+            <a:r>
+              <a:rPr lang="en-US" sz="2000" dirty="0">
+                <a:latin typeface="Courier New" panose="02070309020205020404" pitchFamily="49" charset="0"/>
+                <a:cs typeface="Courier New" panose="02070309020205020404" pitchFamily="49" charset="0"/>
+              </a:rPr>
+              <a:t>	</a:t>
+            </a:r>
+            <a:r>
+              <a:rPr lang="en-US" sz="2000" dirty="0" smtClean="0">
+                <a:latin typeface="Courier New" panose="02070309020205020404" pitchFamily="49" charset="0"/>
+                <a:cs typeface="Courier New" panose="02070309020205020404" pitchFamily="49" charset="0"/>
+              </a:rPr>
+              <a:t/>
+            </a:r>
+            <a:br>
+              <a:rPr lang="en-US" sz="2000" dirty="0" smtClean="0">
+                <a:latin typeface="Courier New" panose="02070309020205020404" pitchFamily="49" charset="0"/>
+                <a:cs typeface="Courier New" panose="02070309020205020404" pitchFamily="49" charset="0"/>
+              </a:rPr>
+            </a:br>
+            <a:r>
+              <a:rPr lang="en-US" sz="2000" dirty="0" smtClean="0">
+                <a:latin typeface="Courier New" panose="02070309020205020404" pitchFamily="49" charset="0"/>
+                <a:cs typeface="Courier New" panose="02070309020205020404" pitchFamily="49" charset="0"/>
+              </a:rPr>
+              <a:t>   </a:t>
+            </a:r>
+            <a:r>
+              <a:rPr lang="en-US" sz="2000" dirty="0" err="1" smtClean="0">
+                <a:latin typeface="Courier New" panose="02070309020205020404" pitchFamily="49" charset="0"/>
+                <a:cs typeface="Courier New" panose="02070309020205020404" pitchFamily="49" charset="0"/>
+              </a:rPr>
+              <a:t>int</a:t>
+            </a:r>
+            <a:r>
+              <a:rPr lang="en-US" sz="2000" dirty="0" smtClean="0">
+                <a:latin typeface="Courier New" panose="02070309020205020404" pitchFamily="49" charset="0"/>
+                <a:cs typeface="Courier New" panose="02070309020205020404" pitchFamily="49" charset="0"/>
+              </a:rPr>
+              <a:t> </a:t>
+            </a:r>
+            <a:r>
+              <a:rPr lang="en-US" sz="2000" dirty="0" err="1">
+                <a:latin typeface="Courier New" panose="02070309020205020404" pitchFamily="49" charset="0"/>
+                <a:cs typeface="Courier New" panose="02070309020205020404" pitchFamily="49" charset="0"/>
+              </a:rPr>
+              <a:t>i</a:t>
+            </a:r>
+            <a:r>
+              <a:rPr lang="en-US" sz="2000" dirty="0">
+                <a:latin typeface="Courier New" panose="02070309020205020404" pitchFamily="49" charset="0"/>
+                <a:cs typeface="Courier New" panose="02070309020205020404" pitchFamily="49" charset="0"/>
+              </a:rPr>
+              <a:t>; </a:t>
+            </a:r>
+            <a:r>
+              <a:rPr lang="en-US" sz="2000" dirty="0" smtClean="0">
+                <a:latin typeface="Courier New" panose="02070309020205020404" pitchFamily="49" charset="0"/>
+                <a:cs typeface="Courier New" panose="02070309020205020404" pitchFamily="49" charset="0"/>
+              </a:rPr>
+              <a:t>  </a:t>
+            </a:r>
+            <a:r>
+              <a:rPr lang="en-US" sz="2000" dirty="0" smtClean="0">
+                <a:latin typeface="Bodoni MT" panose="02070603080606020203" pitchFamily="18" charset="0"/>
+                <a:cs typeface="Courier New" panose="02070309020205020404" pitchFamily="49" charset="0"/>
+              </a:rPr>
+              <a:t>// </a:t>
+            </a:r>
+            <a:r>
+              <a:rPr lang="en-US" sz="2000" dirty="0" err="1">
+                <a:latin typeface="Bodoni MT" panose="02070603080606020203" pitchFamily="18" charset="0"/>
+                <a:cs typeface="Courier New" panose="02070309020205020404" pitchFamily="49" charset="0"/>
+              </a:rPr>
+              <a:t>i</a:t>
+            </a:r>
+            <a:r>
+              <a:rPr lang="en-US" sz="2000" dirty="0">
+                <a:latin typeface="Bodoni MT" panose="02070603080606020203" pitchFamily="18" charset="0"/>
+                <a:cs typeface="Courier New" panose="02070309020205020404" pitchFamily="49" charset="0"/>
+              </a:rPr>
+              <a:t> is the position of l</a:t>
+            </a:r>
+          </a:p>
+          <a:p>
+            <a:pPr marL="0" indent="0">
+              <a:buNone/>
+            </a:pPr>
+            <a:r>
+              <a:rPr lang="en-US" sz="2000" dirty="0" smtClean="0">
+                <a:latin typeface="Courier New" panose="02070309020205020404" pitchFamily="49" charset="0"/>
+                <a:cs typeface="Courier New" panose="02070309020205020404" pitchFamily="49" charset="0"/>
+              </a:rPr>
+              <a:t>         </a:t>
+            </a:r>
+            <a:r>
+              <a:rPr lang="en-US" sz="2000" dirty="0" smtClean="0">
+                <a:latin typeface="Bodoni MT" panose="02070603080606020203" pitchFamily="18" charset="0"/>
+                <a:cs typeface="Courier New" panose="02070309020205020404" pitchFamily="49" charset="0"/>
+              </a:rPr>
+              <a:t>// @loop traverse the list looking for position</a:t>
+            </a:r>
+            <a:r>
+              <a:rPr lang="en-US" sz="2000" dirty="0" smtClean="0">
+                <a:latin typeface="Courier New" panose="02070309020205020404" pitchFamily="49" charset="0"/>
+                <a:cs typeface="Courier New" panose="02070309020205020404" pitchFamily="49" charset="0"/>
+              </a:rPr>
+              <a:t/>
+            </a:r>
+            <a:br>
+              <a:rPr lang="en-US" sz="2000" dirty="0" smtClean="0">
+                <a:latin typeface="Courier New" panose="02070309020205020404" pitchFamily="49" charset="0"/>
+                <a:cs typeface="Courier New" panose="02070309020205020404" pitchFamily="49" charset="0"/>
+              </a:rPr>
+            </a:br>
+            <a:r>
+              <a:rPr lang="en-US" sz="2000" dirty="0" smtClean="0">
+                <a:latin typeface="Courier New" panose="02070309020205020404" pitchFamily="49" charset="0"/>
+                <a:cs typeface="Courier New" panose="02070309020205020404" pitchFamily="49" charset="0"/>
+              </a:rPr>
+              <a:t>   for(l=head</a:t>
+            </a:r>
+            <a:r>
+              <a:rPr lang="en-US" sz="2000" dirty="0">
+                <a:latin typeface="Courier New" panose="02070309020205020404" pitchFamily="49" charset="0"/>
+                <a:cs typeface="Courier New" panose="02070309020205020404" pitchFamily="49" charset="0"/>
+              </a:rPr>
+              <a:t>, p=NULL, </a:t>
+            </a:r>
+            <a:r>
+              <a:rPr lang="en-US" sz="2000" dirty="0" err="1">
+                <a:latin typeface="Courier New" panose="02070309020205020404" pitchFamily="49" charset="0"/>
+                <a:cs typeface="Courier New" panose="02070309020205020404" pitchFamily="49" charset="0"/>
+              </a:rPr>
+              <a:t>i</a:t>
+            </a:r>
+            <a:r>
+              <a:rPr lang="en-US" sz="2000" dirty="0">
+                <a:latin typeface="Courier New" panose="02070309020205020404" pitchFamily="49" charset="0"/>
+                <a:cs typeface="Courier New" panose="02070309020205020404" pitchFamily="49" charset="0"/>
+              </a:rPr>
+              <a:t>=0; l!= NULL &amp;&amp; </a:t>
+            </a:r>
+            <a:r>
+              <a:rPr lang="en-US" sz="2000" dirty="0" err="1">
+                <a:latin typeface="Courier New" panose="02070309020205020404" pitchFamily="49" charset="0"/>
+                <a:cs typeface="Courier New" panose="02070309020205020404" pitchFamily="49" charset="0"/>
+              </a:rPr>
+              <a:t>i</a:t>
+            </a:r>
+            <a:r>
+              <a:rPr lang="en-US" sz="2000" dirty="0">
+                <a:latin typeface="Courier New" panose="02070309020205020404" pitchFamily="49" charset="0"/>
+                <a:cs typeface="Courier New" panose="02070309020205020404" pitchFamily="49" charset="0"/>
+              </a:rPr>
+              <a:t> &lt; </a:t>
+            </a:r>
+            <a:r>
+              <a:rPr lang="en-US" sz="2000" dirty="0" err="1">
+                <a:latin typeface="Courier New" panose="02070309020205020404" pitchFamily="49" charset="0"/>
+                <a:cs typeface="Courier New" panose="02070309020205020404" pitchFamily="49" charset="0"/>
+              </a:rPr>
+              <a:t>pos</a:t>
+            </a:r>
+            <a:r>
+              <a:rPr lang="en-US" sz="2000" dirty="0">
+                <a:latin typeface="Courier New" panose="02070309020205020404" pitchFamily="49" charset="0"/>
+                <a:cs typeface="Courier New" panose="02070309020205020404" pitchFamily="49" charset="0"/>
+              </a:rPr>
+              <a:t> ; l=l-&gt;next, </a:t>
+            </a:r>
+            <a:r>
+              <a:rPr lang="en-US" sz="2000" dirty="0" err="1">
+                <a:latin typeface="Courier New" panose="02070309020205020404" pitchFamily="49" charset="0"/>
+                <a:cs typeface="Courier New" panose="02070309020205020404" pitchFamily="49" charset="0"/>
+              </a:rPr>
+              <a:t>i</a:t>
+            </a:r>
+            <a:r>
+              <a:rPr lang="en-US" sz="2000" dirty="0" smtClean="0">
+                <a:latin typeface="Courier New" panose="02070309020205020404" pitchFamily="49" charset="0"/>
+                <a:cs typeface="Courier New" panose="02070309020205020404" pitchFamily="49" charset="0"/>
+              </a:rPr>
+              <a:t>++)</a:t>
+            </a:r>
+            <a:br>
+              <a:rPr lang="en-US" sz="2000" dirty="0" smtClean="0">
+                <a:latin typeface="Courier New" panose="02070309020205020404" pitchFamily="49" charset="0"/>
+                <a:cs typeface="Courier New" panose="02070309020205020404" pitchFamily="49" charset="0"/>
+              </a:rPr>
+            </a:br>
+            <a:r>
+              <a:rPr lang="en-US" sz="2000" dirty="0" smtClean="0">
+                <a:latin typeface="Courier New" panose="02070309020205020404" pitchFamily="49" charset="0"/>
+                <a:cs typeface="Courier New" panose="02070309020205020404" pitchFamily="49" charset="0"/>
+              </a:rPr>
+              <a:t>         p=l;</a:t>
+            </a:r>
+            <a:endParaRPr lang="en-US" sz="2000" dirty="0">
+              <a:latin typeface="Courier New" panose="02070309020205020404" pitchFamily="49" charset="0"/>
+              <a:cs typeface="Courier New" panose="02070309020205020404" pitchFamily="49" charset="0"/>
+            </a:endParaRPr>
+          </a:p>
+          <a:p>
+            <a:pPr marL="0" indent="0">
+              <a:buNone/>
+            </a:pPr>
+            <a:r>
+              <a:rPr lang="en-US" sz="2000" dirty="0" smtClean="0">
+                <a:latin typeface="Courier New" panose="02070309020205020404" pitchFamily="49" charset="0"/>
+                <a:cs typeface="Courier New" panose="02070309020205020404" pitchFamily="49" charset="0"/>
+              </a:rPr>
+              <a:t>   if </a:t>
+            </a:r>
+            <a:r>
+              <a:rPr lang="en-US" sz="2000" dirty="0">
+                <a:latin typeface="Courier New" panose="02070309020205020404" pitchFamily="49" charset="0"/>
+                <a:cs typeface="Courier New" panose="02070309020205020404" pitchFamily="49" charset="0"/>
+              </a:rPr>
+              <a:t>( p == NULL ) </a:t>
+            </a:r>
+            <a:r>
+              <a:rPr lang="en-US" sz="2000" dirty="0" smtClean="0">
+                <a:latin typeface="Courier New" panose="02070309020205020404" pitchFamily="49" charset="0"/>
+                <a:cs typeface="Courier New" panose="02070309020205020404" pitchFamily="49" charset="0"/>
+              </a:rPr>
+              <a:t>{  </a:t>
+            </a:r>
+            <a:r>
+              <a:rPr lang="en-US" sz="2000" dirty="0" smtClean="0">
+                <a:latin typeface="Bodoni MT" panose="02070603080606020203" pitchFamily="18" charset="0"/>
+                <a:cs typeface="Courier New" panose="02070309020205020404" pitchFamily="49" charset="0"/>
+              </a:rPr>
+              <a:t>// delete beginning element if it exists: empty list or just one element case</a:t>
+            </a:r>
+            <a:r>
+              <a:rPr lang="en-US" sz="2000" dirty="0" smtClean="0">
+                <a:latin typeface="Courier New" panose="02070309020205020404" pitchFamily="49" charset="0"/>
+                <a:cs typeface="Courier New" panose="02070309020205020404" pitchFamily="49" charset="0"/>
+              </a:rPr>
+              <a:t/>
+            </a:r>
+            <a:br>
+              <a:rPr lang="en-US" sz="2000" dirty="0" smtClean="0">
+                <a:latin typeface="Courier New" panose="02070309020205020404" pitchFamily="49" charset="0"/>
+                <a:cs typeface="Courier New" panose="02070309020205020404" pitchFamily="49" charset="0"/>
+              </a:rPr>
+            </a:br>
+            <a:r>
+              <a:rPr lang="en-US" sz="2000" dirty="0" smtClean="0">
+                <a:latin typeface="Courier New" panose="02070309020205020404" pitchFamily="49" charset="0"/>
+                <a:cs typeface="Courier New" panose="02070309020205020404" pitchFamily="49" charset="0"/>
+              </a:rPr>
+              <a:t>         head = head ? head-&gt;next: NULL;</a:t>
+            </a:r>
+            <a:br>
+              <a:rPr lang="en-US" sz="2000" dirty="0" smtClean="0">
+                <a:latin typeface="Courier New" panose="02070309020205020404" pitchFamily="49" charset="0"/>
+                <a:cs typeface="Courier New" panose="02070309020205020404" pitchFamily="49" charset="0"/>
+              </a:rPr>
+            </a:br>
+            <a:r>
+              <a:rPr lang="en-US" sz="2000" dirty="0" smtClean="0">
+                <a:latin typeface="Courier New" panose="02070309020205020404" pitchFamily="49" charset="0"/>
+                <a:cs typeface="Courier New" panose="02070309020205020404" pitchFamily="49" charset="0"/>
+              </a:rPr>
+              <a:t>         if ( l ) free (l); </a:t>
+            </a:r>
+            <a:br>
+              <a:rPr lang="en-US" sz="2000" dirty="0" smtClean="0">
+                <a:latin typeface="Courier New" panose="02070309020205020404" pitchFamily="49" charset="0"/>
+                <a:cs typeface="Courier New" panose="02070309020205020404" pitchFamily="49" charset="0"/>
+              </a:rPr>
+            </a:br>
+            <a:r>
+              <a:rPr lang="en-US" sz="2000" dirty="0" smtClean="0">
+                <a:latin typeface="Courier New" panose="02070309020205020404" pitchFamily="49" charset="0"/>
+                <a:cs typeface="Courier New" panose="02070309020205020404" pitchFamily="49" charset="0"/>
+              </a:rPr>
+              <a:t>         return head;     </a:t>
+            </a:r>
+            <a:r>
+              <a:rPr lang="en-US" sz="2000" dirty="0" smtClean="0">
+                <a:latin typeface="Bodoni MT" panose="02070603080606020203" pitchFamily="18" charset="0"/>
+                <a:cs typeface="Courier New" panose="02070309020205020404" pitchFamily="49" charset="0"/>
+              </a:rPr>
+              <a:t>// we’ll return a new head</a:t>
+            </a:r>
+            <a:r>
+              <a:rPr lang="en-US" sz="2000" dirty="0" smtClean="0">
+                <a:latin typeface="Courier New" panose="02070309020205020404" pitchFamily="49" charset="0"/>
+                <a:cs typeface="Courier New" panose="02070309020205020404" pitchFamily="49" charset="0"/>
+              </a:rPr>
+              <a:t/>
+            </a:r>
+            <a:br>
+              <a:rPr lang="en-US" sz="2000" dirty="0" smtClean="0">
+                <a:latin typeface="Courier New" panose="02070309020205020404" pitchFamily="49" charset="0"/>
+                <a:cs typeface="Courier New" panose="02070309020205020404" pitchFamily="49" charset="0"/>
+              </a:rPr>
+            </a:br>
+            <a:r>
+              <a:rPr lang="en-US" sz="2000" dirty="0" smtClean="0">
+                <a:latin typeface="Courier New" panose="02070309020205020404" pitchFamily="49" charset="0"/>
+                <a:cs typeface="Courier New" panose="02070309020205020404" pitchFamily="49" charset="0"/>
+              </a:rPr>
+              <a:t>   }</a:t>
+            </a:r>
+          </a:p>
+          <a:p>
+            <a:pPr marL="0" indent="0">
+              <a:buNone/>
+            </a:pPr>
+            <a:r>
+              <a:rPr lang="en-US" sz="2000" dirty="0">
+                <a:latin typeface="Courier New" panose="02070309020205020404" pitchFamily="49" charset="0"/>
+                <a:cs typeface="Courier New" panose="02070309020205020404" pitchFamily="49" charset="0"/>
+              </a:rPr>
+              <a:t> </a:t>
+            </a:r>
+            <a:r>
+              <a:rPr lang="en-US" sz="2000" dirty="0" smtClean="0">
+                <a:latin typeface="Courier New" panose="02070309020205020404" pitchFamily="49" charset="0"/>
+                <a:cs typeface="Courier New" panose="02070309020205020404" pitchFamily="49" charset="0"/>
+              </a:rPr>
+              <a:t>      </a:t>
+            </a:r>
+            <a:r>
+              <a:rPr lang="en-US" sz="2000" dirty="0" smtClean="0">
+                <a:latin typeface="Bodoni MT" panose="02070603080606020203" pitchFamily="18" charset="0"/>
+                <a:cs typeface="Courier New" panose="02070309020205020404" pitchFamily="49" charset="0"/>
+              </a:rPr>
+              <a:t>// Now l  points to the node to delete</a:t>
+            </a:r>
+            <a:endParaRPr lang="en-US" sz="2000" dirty="0">
+              <a:latin typeface="Bodoni MT" panose="02070603080606020203" pitchFamily="18" charset="0"/>
+              <a:cs typeface="Courier New" panose="02070309020205020404" pitchFamily="49" charset="0"/>
+            </a:endParaRPr>
+          </a:p>
+          <a:p>
+            <a:pPr marL="0" indent="0">
+              <a:buNone/>
+            </a:pPr>
+            <a:r>
+              <a:rPr lang="en-US" sz="2000" dirty="0" smtClean="0">
+                <a:latin typeface="Courier New" panose="02070309020205020404" pitchFamily="49" charset="0"/>
+                <a:cs typeface="Courier New" panose="02070309020205020404" pitchFamily="49" charset="0"/>
+              </a:rPr>
+              <a:t>   p-&gt;next= l ? l-&gt;next: NULL;    </a:t>
+            </a:r>
+            <a:r>
+              <a:rPr lang="en-US" sz="2000" dirty="0" smtClean="0">
+                <a:latin typeface="Bodoni MT" panose="02070603080606020203" pitchFamily="18" charset="0"/>
+                <a:cs typeface="Courier New" panose="02070309020205020404" pitchFamily="49" charset="0"/>
+              </a:rPr>
+              <a:t>// check if l is not NULL</a:t>
+            </a:r>
+            <a:r>
+              <a:rPr lang="en-US" sz="2000" dirty="0" smtClean="0">
+                <a:latin typeface="Courier New" panose="02070309020205020404" pitchFamily="49" charset="0"/>
+                <a:cs typeface="Courier New" panose="02070309020205020404" pitchFamily="49" charset="0"/>
+              </a:rPr>
+              <a:t/>
+            </a:r>
+            <a:br>
+              <a:rPr lang="en-US" sz="2000" dirty="0" smtClean="0">
+                <a:latin typeface="Courier New" panose="02070309020205020404" pitchFamily="49" charset="0"/>
+                <a:cs typeface="Courier New" panose="02070309020205020404" pitchFamily="49" charset="0"/>
+              </a:rPr>
+            </a:br>
+            <a:r>
+              <a:rPr lang="en-US" sz="2000" dirty="0" smtClean="0">
+                <a:latin typeface="Courier New" panose="02070309020205020404" pitchFamily="49" charset="0"/>
+                <a:cs typeface="Courier New" panose="02070309020205020404" pitchFamily="49" charset="0"/>
+              </a:rPr>
+              <a:t>   if ( l ) free(l); </a:t>
+            </a:r>
+            <a:r>
+              <a:rPr lang="en-US" sz="2000" dirty="0" smtClean="0">
+                <a:latin typeface="Bodoni MT" panose="02070603080606020203" pitchFamily="18" charset="0"/>
+                <a:cs typeface="Courier New" panose="02070309020205020404" pitchFamily="49" charset="0"/>
+              </a:rPr>
+              <a:t>  // since we will no longer use this node in this example</a:t>
+            </a:r>
+            <a:r>
+              <a:rPr lang="en-US" sz="2000" dirty="0" smtClean="0">
+                <a:latin typeface="Courier New" panose="02070309020205020404" pitchFamily="49" charset="0"/>
+                <a:cs typeface="Courier New" panose="02070309020205020404" pitchFamily="49" charset="0"/>
+              </a:rPr>
+              <a:t/>
+            </a:r>
+            <a:br>
+              <a:rPr lang="en-US" sz="2000" dirty="0" smtClean="0">
+                <a:latin typeface="Courier New" panose="02070309020205020404" pitchFamily="49" charset="0"/>
+                <a:cs typeface="Courier New" panose="02070309020205020404" pitchFamily="49" charset="0"/>
+              </a:rPr>
+            </a:br>
+            <a:r>
+              <a:rPr lang="en-US" sz="2000" dirty="0" smtClean="0">
+                <a:latin typeface="Courier New" panose="02070309020205020404" pitchFamily="49" charset="0"/>
+                <a:cs typeface="Courier New" panose="02070309020205020404" pitchFamily="49" charset="0"/>
+              </a:rPr>
+              <a:t>   return </a:t>
+            </a:r>
+            <a:r>
+              <a:rPr lang="en-US" sz="2000" dirty="0">
+                <a:latin typeface="Courier New" panose="02070309020205020404" pitchFamily="49" charset="0"/>
+                <a:cs typeface="Courier New" panose="02070309020205020404" pitchFamily="49" charset="0"/>
+              </a:rPr>
+              <a:t>head</a:t>
+            </a:r>
+            <a:r>
+              <a:rPr lang="en-US" sz="2000" dirty="0" smtClean="0">
+                <a:latin typeface="Courier New" panose="02070309020205020404" pitchFamily="49" charset="0"/>
+                <a:cs typeface="Courier New" panose="02070309020205020404" pitchFamily="49" charset="0"/>
+              </a:rPr>
+              <a:t>;       </a:t>
+            </a:r>
+            <a:r>
+              <a:rPr lang="en-US" sz="2000" dirty="0" smtClean="0">
+                <a:latin typeface="Bodoni MT" panose="02070603080606020203" pitchFamily="18" charset="0"/>
+                <a:cs typeface="Courier New" panose="02070309020205020404" pitchFamily="49" charset="0"/>
+              </a:rPr>
+              <a:t>// …  and return the old head</a:t>
+            </a:r>
+            <a:endParaRPr lang="en-US" sz="2000" dirty="0">
+              <a:latin typeface="Bodoni MT" panose="02070603080606020203" pitchFamily="18" charset="0"/>
+              <a:cs typeface="Courier New" panose="02070309020205020404" pitchFamily="49" charset="0"/>
+            </a:endParaRPr>
+          </a:p>
+          <a:p>
+            <a:pPr marL="0" indent="0">
+              <a:buNone/>
+            </a:pPr>
+            <a:r>
+              <a:rPr lang="en-US" sz="2000" dirty="0">
+                <a:latin typeface="Courier New" panose="02070309020205020404" pitchFamily="49" charset="0"/>
+                <a:cs typeface="Courier New" panose="02070309020205020404" pitchFamily="49" charset="0"/>
+              </a:rPr>
+              <a:t>}</a:t>
+            </a:r>
+          </a:p>
+        </p:txBody>
+      </p:sp>
+    </p:spTree>
+    <p:extLst>
+      <p:ext uri="{BB962C8B-B14F-4D97-AF65-F5344CB8AC3E}">
+        <p14:creationId xmlns:p14="http://schemas.microsoft.com/office/powerpoint/2010/main" val="1599455929"/>
+      </p:ext>
+    </p:extLst>
+  </p:cSld>
+  <p:clrMapOvr>
+    <a:masterClrMapping/>
+  </p:clrMapOvr>
+  <p:timing>
+    <p:tnLst>
+      <p:par>
+        <p:cTn id="1" dur="indefinite" restart="never" nodeType="tmRoot">
+          <p:childTnLst>
+            <p:seq concurrent="1" nextAc="seek">
+              <p:cTn id="2" dur="indefinite" nodeType="mainSeq">
+                <p:childTnLst>
+                  <p:par>
+                    <p:cTn id="3" fill="hold">
+                      <p:stCondLst>
+                        <p:cond delay="indefinite"/>
+                      </p:stCondLst>
+                      <p:childTnLst>
+                        <p:par>
+                          <p:cTn id="4" fill="hold">
+                            <p:stCondLst>
+                              <p:cond delay="0"/>
+                            </p:stCondLst>
+                            <p:childTnLst>
+                              <p:par>
+                                <p:cTn id="5" presetID="1" presetClass="entr" presetSubtype="0" fill="hold" nodeType="clickEffect">
+                                  <p:stCondLst>
+                                    <p:cond delay="0"/>
+                                  </p:stCondLst>
+                                  <p:childTnLst>
+                                    <p:set>
+                                      <p:cBhvr>
+                                        <p:cTn id="6" dur="1" fill="hold">
+                                          <p:stCondLst>
+                                            <p:cond delay="0"/>
+                                          </p:stCondLst>
+                                        </p:cTn>
+                                        <p:tgtEl>
+                                          <p:spTgt spid="3">
+                                            <p:txEl>
+                                              <p:pRg st="1" end="1"/>
+                                            </p:txEl>
+                                          </p:spTgt>
+                                        </p:tgtEl>
+                                        <p:attrNameLst>
+                                          <p:attrName>style.visibility</p:attrName>
+                                        </p:attrNameLst>
+                                      </p:cBhvr>
+                                      <p:to>
+                                        <p:strVal val="visible"/>
+                                      </p:to>
+                                    </p:set>
+                                  </p:childTnLst>
+                                </p:cTn>
+                              </p:par>
+                            </p:childTnLst>
+                          </p:cTn>
+                        </p:par>
+                      </p:childTnLst>
+                    </p:cTn>
+                  </p:par>
+                  <p:par>
+                    <p:cTn id="7" fill="hold">
+                      <p:stCondLst>
+                        <p:cond delay="indefinite"/>
+                      </p:stCondLst>
+                      <p:childTnLst>
+                        <p:par>
+                          <p:cTn id="8" fill="hold">
+                            <p:stCondLst>
+                              <p:cond delay="0"/>
+                            </p:stCondLst>
+                            <p:childTnLst>
+                              <p:par>
+                                <p:cTn id="9" presetID="1" presetClass="entr" presetSubtype="0" fill="hold" nodeType="clickEffect">
+                                  <p:stCondLst>
+                                    <p:cond delay="0"/>
+                                  </p:stCondLst>
+                                  <p:childTnLst>
+                                    <p:set>
+                                      <p:cBhvr>
+                                        <p:cTn id="10" dur="1" fill="hold">
+                                          <p:stCondLst>
+                                            <p:cond delay="0"/>
+                                          </p:stCondLst>
+                                        </p:cTn>
+                                        <p:tgtEl>
+                                          <p:spTgt spid="3">
+                                            <p:txEl>
+                                              <p:pRg st="2" end="2"/>
+                                            </p:txEl>
+                                          </p:spTgt>
+                                        </p:tgtEl>
+                                        <p:attrNameLst>
+                                          <p:attrName>style.visibility</p:attrName>
+                                        </p:attrNameLst>
+                                      </p:cBhvr>
+                                      <p:to>
+                                        <p:strVal val="visible"/>
+                                      </p:to>
+                                    </p:set>
+                                  </p:childTnLst>
+                                </p:cTn>
+                              </p:par>
+                            </p:childTnLst>
+                          </p:cTn>
+                        </p:par>
+                      </p:childTnLst>
+                    </p:cTn>
+                  </p:par>
+                  <p:par>
+                    <p:cTn id="11" fill="hold">
+                      <p:stCondLst>
+                        <p:cond delay="indefinite"/>
+                      </p:stCondLst>
+                      <p:childTnLst>
+                        <p:par>
+                          <p:cTn id="12" fill="hold">
+                            <p:stCondLst>
+                              <p:cond delay="0"/>
+                            </p:stCondLst>
+                            <p:childTnLst>
+                              <p:par>
+                                <p:cTn id="13" presetID="1" presetClass="entr" presetSubtype="0" fill="hold" nodeType="clickEffect">
+                                  <p:stCondLst>
+                                    <p:cond delay="0"/>
+                                  </p:stCondLst>
+                                  <p:childTnLst>
+                                    <p:set>
+                                      <p:cBhvr>
+                                        <p:cTn id="14" dur="1" fill="hold">
+                                          <p:stCondLst>
+                                            <p:cond delay="0"/>
+                                          </p:stCondLst>
+                                        </p:cTn>
+                                        <p:tgtEl>
+                                          <p:spTgt spid="3">
+                                            <p:txEl>
+                                              <p:pRg st="3" end="3"/>
+                                            </p:txEl>
+                                          </p:spTgt>
+                                        </p:tgtEl>
+                                        <p:attrNameLst>
+                                          <p:attrName>style.visibility</p:attrName>
+                                        </p:attrNameLst>
+                                      </p:cBhvr>
+                                      <p:to>
+                                        <p:strVal val="visible"/>
+                                      </p:to>
+                                    </p:set>
+                                  </p:childTnLst>
+                                </p:cTn>
+                              </p:par>
+                            </p:childTnLst>
+                          </p:cTn>
+                        </p:par>
+                      </p:childTnLst>
+                    </p:cTn>
+                  </p:par>
+                  <p:par>
+                    <p:cTn id="15" fill="hold">
+                      <p:stCondLst>
+                        <p:cond delay="indefinite"/>
+                      </p:stCondLst>
+                      <p:childTnLst>
+                        <p:par>
+                          <p:cTn id="16" fill="hold">
+                            <p:stCondLst>
+                              <p:cond delay="0"/>
+                            </p:stCondLst>
+                            <p:childTnLst>
+                              <p:par>
+                                <p:cTn id="17" presetID="1" presetClass="entr" presetSubtype="0" fill="hold" nodeType="clickEffect">
+                                  <p:stCondLst>
+                                    <p:cond delay="0"/>
+                                  </p:stCondLst>
+                                  <p:childTnLst>
+                                    <p:set>
+                                      <p:cBhvr>
+                                        <p:cTn id="18" dur="1" fill="hold">
+                                          <p:stCondLst>
+                                            <p:cond delay="0"/>
+                                          </p:stCondLst>
+                                        </p:cTn>
+                                        <p:tgtEl>
+                                          <p:spTgt spid="3">
+                                            <p:txEl>
+                                              <p:pRg st="4" end="4"/>
+                                            </p:txEl>
+                                          </p:spTgt>
+                                        </p:tgtEl>
+                                        <p:attrNameLst>
+                                          <p:attrName>style.visibility</p:attrName>
+                                        </p:attrNameLst>
+                                      </p:cBhvr>
+                                      <p:to>
+                                        <p:strVal val="visible"/>
+                                      </p:to>
+                                    </p:set>
+                                  </p:childTnLst>
+                                </p:cTn>
+                              </p:par>
+                            </p:childTnLst>
+                          </p:cTn>
+                        </p:par>
+                      </p:childTnLst>
+                    </p:cTn>
+                  </p:par>
+                  <p:par>
+                    <p:cTn id="19" fill="hold">
+                      <p:stCondLst>
+                        <p:cond delay="indefinite"/>
+                      </p:stCondLst>
+                      <p:childTnLst>
+                        <p:par>
+                          <p:cTn id="20" fill="hold">
+                            <p:stCondLst>
+                              <p:cond delay="0"/>
+                            </p:stCondLst>
+                            <p:childTnLst>
+                              <p:par>
+                                <p:cTn id="21" presetID="1" presetClass="entr" presetSubtype="0" fill="hold" nodeType="clickEffect">
+                                  <p:stCondLst>
+                                    <p:cond delay="0"/>
+                                  </p:stCondLst>
+                                  <p:childTnLst>
+                                    <p:set>
+                                      <p:cBhvr>
+                                        <p:cTn id="22" dur="1" fill="hold">
+                                          <p:stCondLst>
+                                            <p:cond delay="0"/>
+                                          </p:stCondLst>
+                                        </p:cTn>
+                                        <p:tgtEl>
+                                          <p:spTgt spid="3">
+                                            <p:txEl>
+                                              <p:pRg st="5" end="5"/>
+                                            </p:txEl>
+                                          </p:spTgt>
+                                        </p:tgtEl>
+                                        <p:attrNameLst>
+                                          <p:attrName>style.visibility</p:attrName>
+                                        </p:attrNameLst>
+                                      </p:cBhvr>
+                                      <p:to>
+                                        <p:strVal val="visible"/>
+                                      </p:to>
+                                    </p:set>
+                                  </p:childTnLst>
+                                </p:cTn>
+                              </p:par>
+                            </p:childTnLst>
+                          </p:cTn>
+                        </p:par>
+                      </p:childTnLst>
+                    </p:cTn>
+                  </p:par>
+                </p:childTnLst>
+              </p:cTn>
+              <p:prevCondLst>
+                <p:cond evt="onPrev" delay="0">
+                  <p:tgtEl>
+                    <p:sldTgt/>
+                  </p:tgtEl>
+                </p:cond>
+              </p:prevCondLst>
+              <p:nextCondLst>
+                <p:cond evt="onNext" delay="0">
+                  <p:tgtEl>
+                    <p:sldTgt/>
+                  </p:tgtEl>
+                </p:cond>
+              </p:nextCondLst>
+            </p:seq>
+          </p:childTnLst>
+        </p:cTn>
+      </p:par>
+    </p:tnLst>
+  </p:timing>
+</p:sld>
+</file>
+
+<file path=ppt/slides/slide11.xml><?xml version="1.0" encoding="utf-8"?>
+<p:sld xmlns:a="http://schemas.openxmlformats.org/drawingml/2006/main" xmlns:r="http://schemas.openxmlformats.org/officeDocument/2006/relationships" xmlns:p="http://schemas.openxmlformats.org/presentationml/2006/main">
+  <p:cSld>
+    <p:spTree>
+      <p:nvGrpSpPr>
+        <p:cNvPr id="1" name=""/>
+        <p:cNvGrpSpPr/>
+        <p:nvPr/>
+      </p:nvGrpSpPr>
+      <p:grpSpPr>
+        <a:xfrm>
+          <a:off x="0" y="0"/>
+          <a:ext cx="0" cy="0"/>
+          <a:chOff x="0" y="0"/>
+          <a:chExt cx="0" cy="0"/>
+        </a:xfrm>
+      </p:grpSpPr>
+      <p:sp>
+        <p:nvSpPr>
+          <p:cNvPr id="2" name="Title 1"/>
+          <p:cNvSpPr>
+            <a:spLocks noGrp="1"/>
+          </p:cNvSpPr>
+          <p:nvPr>
+            <p:ph type="title"/>
+          </p:nvPr>
+        </p:nvSpPr>
+        <p:spPr/>
+        <p:txBody>
+          <a:bodyPr/>
+          <a:lstStyle/>
+          <a:p>
+            <a:r>
+              <a:rPr lang="en-US" dirty="0" smtClean="0"/>
+              <a:t>More linked list exercises</a:t>
+            </a:r>
+            <a:endParaRPr lang="en-US" dirty="0"/>
+          </a:p>
+        </p:txBody>
+      </p:sp>
+      <p:sp>
+        <p:nvSpPr>
+          <p:cNvPr id="3" name="Content Placeholder 2"/>
+          <p:cNvSpPr>
+            <a:spLocks noGrp="1"/>
+          </p:cNvSpPr>
+          <p:nvPr>
+            <p:ph idx="1"/>
+          </p:nvPr>
+        </p:nvSpPr>
+        <p:spPr/>
+        <p:txBody>
+          <a:bodyPr/>
+          <a:lstStyle/>
+          <a:p>
+            <a:r>
+              <a:rPr lang="en-US" dirty="0" smtClean="0"/>
+              <a:t>See </a:t>
+            </a:r>
+            <a:r>
+              <a:rPr lang="en-US" dirty="0" err="1" smtClean="0">
+                <a:latin typeface="Courier New" panose="02070309020205020404" pitchFamily="49" charset="0"/>
+                <a:cs typeface="Courier New" panose="02070309020205020404" pitchFamily="49" charset="0"/>
+              </a:rPr>
+              <a:t>linked_list.c</a:t>
+            </a:r>
+            <a:endParaRPr lang="en-US" dirty="0">
+              <a:latin typeface="Courier New" panose="02070309020205020404" pitchFamily="49" charset="0"/>
+              <a:cs typeface="Courier New" panose="02070309020205020404" pitchFamily="49" charset="0"/>
+            </a:endParaRPr>
+          </a:p>
+        </p:txBody>
+      </p:sp>
+    </p:spTree>
+    <p:extLst>
+      <p:ext uri="{BB962C8B-B14F-4D97-AF65-F5344CB8AC3E}">
+        <p14:creationId xmlns:p14="http://schemas.microsoft.com/office/powerpoint/2010/main" val="102614128"/>
+      </p:ext>
+    </p:extLst>
+  </p:cSld>
+  <p:clrMapOvr>
+    <a:masterClrMapping/>
+  </p:clrMapOvr>
 </p:sld>
 </file>
 
@@ -15371,19 +16377,18 @@
             <p:ph type="title"/>
           </p:nvPr>
         </p:nvSpPr>
-        <p:spPr>
-          <a:xfrm>
-            <a:off x="838200" y="14935"/>
-            <a:ext cx="10515600" cy="1325563"/>
-          </a:xfrm>
-        </p:spPr>
+        <p:spPr/>
         <p:txBody>
           <a:bodyPr/>
           <a:lstStyle/>
           <a:p>
             <a:r>
               <a:rPr lang="en-US" dirty="0" smtClean="0"/>
-              <a:t>Inserting into a position in a linked list</a:t>
+              <a:t>Introductory linked list </a:t>
+            </a:r>
+            <a:r>
+              <a:rPr lang="en-US" dirty="0" err="1" smtClean="0"/>
+              <a:t>exercses</a:t>
             </a:r>
             <a:endParaRPr lang="en-US" dirty="0"/>
           </a:p>
@@ -15399,1154 +16404,39 @@
             <p:ph idx="1"/>
           </p:nvPr>
         </p:nvSpPr>
-        <p:spPr>
-          <a:xfrm>
-            <a:off x="507458" y="950142"/>
-            <a:ext cx="11684542" cy="5956504"/>
-          </a:xfrm>
-        </p:spPr>
+        <p:spPr/>
         <p:txBody>
-          <a:bodyPr>
-            <a:noAutofit/>
-          </a:bodyPr>
+          <a:bodyPr/>
           <a:lstStyle/>
           <a:p>
-            <a:pPr marL="0" indent="0">
-              <a:buNone/>
-            </a:pPr>
-            <a:r>
-              <a:rPr lang="en-US" sz="2200" dirty="0" err="1">
-                <a:latin typeface="Courier New" panose="02070309020205020404" pitchFamily="49" charset="0"/>
-                <a:cs typeface="Courier New" panose="02070309020205020404" pitchFamily="49" charset="0"/>
-              </a:rPr>
-              <a:t>struct</a:t>
-            </a:r>
-            <a:r>
-              <a:rPr lang="en-US" sz="2200" dirty="0">
-                <a:latin typeface="Courier New" panose="02070309020205020404" pitchFamily="49" charset="0"/>
-                <a:cs typeface="Courier New" panose="02070309020205020404" pitchFamily="49" charset="0"/>
-              </a:rPr>
-              <a:t> node * </a:t>
-            </a:r>
-            <a:r>
-              <a:rPr lang="en-US" sz="2200" dirty="0" err="1">
-                <a:latin typeface="Courier New" panose="02070309020205020404" pitchFamily="49" charset="0"/>
-                <a:cs typeface="Courier New" panose="02070309020205020404" pitchFamily="49" charset="0"/>
-              </a:rPr>
-              <a:t>node_insert</a:t>
-            </a:r>
-            <a:r>
-              <a:rPr lang="en-US" sz="2200" dirty="0">
-                <a:latin typeface="Courier New" panose="02070309020205020404" pitchFamily="49" charset="0"/>
-                <a:cs typeface="Courier New" panose="02070309020205020404" pitchFamily="49" charset="0"/>
-              </a:rPr>
-              <a:t>(</a:t>
-            </a:r>
-            <a:r>
-              <a:rPr lang="en-US" sz="2200" dirty="0" err="1">
-                <a:latin typeface="Courier New" panose="02070309020205020404" pitchFamily="49" charset="0"/>
-                <a:cs typeface="Courier New" panose="02070309020205020404" pitchFamily="49" charset="0"/>
-              </a:rPr>
-              <a:t>struct</a:t>
-            </a:r>
-            <a:r>
-              <a:rPr lang="en-US" sz="2200" dirty="0">
-                <a:latin typeface="Courier New" panose="02070309020205020404" pitchFamily="49" charset="0"/>
-                <a:cs typeface="Courier New" panose="02070309020205020404" pitchFamily="49" charset="0"/>
-              </a:rPr>
-              <a:t> node * head, </a:t>
-            </a:r>
-            <a:r>
-              <a:rPr lang="en-US" sz="2200" dirty="0" err="1">
-                <a:latin typeface="Courier New" panose="02070309020205020404" pitchFamily="49" charset="0"/>
-                <a:cs typeface="Courier New" panose="02070309020205020404" pitchFamily="49" charset="0"/>
-              </a:rPr>
-              <a:t>int</a:t>
-            </a:r>
-            <a:r>
-              <a:rPr lang="en-US" sz="2200" dirty="0">
-                <a:latin typeface="Courier New" panose="02070309020205020404" pitchFamily="49" charset="0"/>
-                <a:cs typeface="Courier New" panose="02070309020205020404" pitchFamily="49" charset="0"/>
-              </a:rPr>
-              <a:t> </a:t>
-            </a:r>
-            <a:r>
-              <a:rPr lang="en-US" sz="2200" dirty="0" err="1">
-                <a:latin typeface="Courier New" panose="02070309020205020404" pitchFamily="49" charset="0"/>
-                <a:cs typeface="Courier New" panose="02070309020205020404" pitchFamily="49" charset="0"/>
-              </a:rPr>
-              <a:t>pos</a:t>
-            </a:r>
-            <a:r>
-              <a:rPr lang="en-US" sz="2200" dirty="0">
-                <a:latin typeface="Courier New" panose="02070309020205020404" pitchFamily="49" charset="0"/>
-                <a:cs typeface="Courier New" panose="02070309020205020404" pitchFamily="49" charset="0"/>
-              </a:rPr>
-              <a:t>, </a:t>
-            </a:r>
-            <a:r>
-              <a:rPr lang="en-US" sz="2200" dirty="0" err="1">
-                <a:latin typeface="Courier New" panose="02070309020205020404" pitchFamily="49" charset="0"/>
-                <a:cs typeface="Courier New" panose="02070309020205020404" pitchFamily="49" charset="0"/>
-              </a:rPr>
-              <a:t>int</a:t>
-            </a:r>
-            <a:r>
-              <a:rPr lang="en-US" sz="2200" dirty="0">
-                <a:latin typeface="Courier New" panose="02070309020205020404" pitchFamily="49" charset="0"/>
-                <a:cs typeface="Courier New" panose="02070309020205020404" pitchFamily="49" charset="0"/>
-              </a:rPr>
-              <a:t> </a:t>
-            </a:r>
-            <a:r>
-              <a:rPr lang="en-US" sz="2200" dirty="0" err="1">
-                <a:latin typeface="Courier New" panose="02070309020205020404" pitchFamily="49" charset="0"/>
-                <a:cs typeface="Courier New" panose="02070309020205020404" pitchFamily="49" charset="0"/>
-              </a:rPr>
-              <a:t>newval</a:t>
-            </a:r>
-            <a:r>
-              <a:rPr lang="en-US" sz="2200" dirty="0">
-                <a:latin typeface="Courier New" panose="02070309020205020404" pitchFamily="49" charset="0"/>
-                <a:cs typeface="Courier New" panose="02070309020205020404" pitchFamily="49" charset="0"/>
-              </a:rPr>
-              <a:t>){</a:t>
-            </a:r>
-          </a:p>
-          <a:p>
-            <a:pPr marL="0" indent="0">
-              <a:buNone/>
-            </a:pPr>
-            <a:r>
-              <a:rPr lang="en-US" sz="2200" dirty="0" smtClean="0">
-                <a:latin typeface="Courier New" panose="02070309020205020404" pitchFamily="49" charset="0"/>
-                <a:cs typeface="Courier New" panose="02070309020205020404" pitchFamily="49" charset="0"/>
-              </a:rPr>
-              <a:t>   </a:t>
-            </a:r>
-            <a:r>
-              <a:rPr lang="en-US" sz="2200" dirty="0" err="1" smtClean="0">
-                <a:latin typeface="Courier New" panose="02070309020205020404" pitchFamily="49" charset="0"/>
-                <a:cs typeface="Courier New" panose="02070309020205020404" pitchFamily="49" charset="0"/>
-              </a:rPr>
-              <a:t>struct</a:t>
-            </a:r>
-            <a:r>
-              <a:rPr lang="en-US" sz="2200" dirty="0" smtClean="0">
-                <a:latin typeface="Courier New" panose="02070309020205020404" pitchFamily="49" charset="0"/>
-                <a:cs typeface="Courier New" panose="02070309020205020404" pitchFamily="49" charset="0"/>
-              </a:rPr>
-              <a:t> </a:t>
-            </a:r>
-            <a:r>
-              <a:rPr lang="en-US" sz="2200" dirty="0">
-                <a:latin typeface="Courier New" panose="02070309020205020404" pitchFamily="49" charset="0"/>
-                <a:cs typeface="Courier New" panose="02070309020205020404" pitchFamily="49" charset="0"/>
-              </a:rPr>
-              <a:t>node * l, * p</a:t>
-            </a:r>
-            <a:r>
-              <a:rPr lang="en-US" sz="2200" dirty="0" smtClean="0">
-                <a:latin typeface="Courier New" panose="02070309020205020404" pitchFamily="49" charset="0"/>
-                <a:cs typeface="Courier New" panose="02070309020205020404" pitchFamily="49" charset="0"/>
-              </a:rPr>
-              <a:t>;   </a:t>
-            </a:r>
-            <a:r>
-              <a:rPr lang="en-US" sz="2200" dirty="0" smtClean="0">
-                <a:latin typeface="Bodoni MT" panose="02070603080606020203" pitchFamily="18" charset="0"/>
-                <a:cs typeface="Courier New" panose="02070309020205020404" pitchFamily="49" charset="0"/>
-              </a:rPr>
-              <a:t>// we need two positions to insert between</a:t>
-            </a:r>
-            <a:r>
-              <a:rPr lang="en-US" sz="2200" dirty="0" smtClean="0">
-                <a:latin typeface="Courier New" panose="02070309020205020404" pitchFamily="49" charset="0"/>
-                <a:cs typeface="Courier New" panose="02070309020205020404" pitchFamily="49" charset="0"/>
-              </a:rPr>
-              <a:t> </a:t>
-            </a:r>
-            <a:r>
-              <a:rPr lang="en-US" sz="2200" dirty="0">
-                <a:latin typeface="Courier New" panose="02070309020205020404" pitchFamily="49" charset="0"/>
-                <a:cs typeface="Courier New" panose="02070309020205020404" pitchFamily="49" charset="0"/>
-              </a:rPr>
-              <a:t>	</a:t>
-            </a:r>
-            <a:r>
-              <a:rPr lang="en-US" sz="2200" dirty="0" smtClean="0">
-                <a:latin typeface="Courier New" panose="02070309020205020404" pitchFamily="49" charset="0"/>
-                <a:cs typeface="Courier New" panose="02070309020205020404" pitchFamily="49" charset="0"/>
-              </a:rPr>
-              <a:t/>
-            </a:r>
-            <a:br>
-              <a:rPr lang="en-US" sz="2200" dirty="0" smtClean="0">
-                <a:latin typeface="Courier New" panose="02070309020205020404" pitchFamily="49" charset="0"/>
-                <a:cs typeface="Courier New" panose="02070309020205020404" pitchFamily="49" charset="0"/>
-              </a:rPr>
-            </a:br>
-            <a:r>
-              <a:rPr lang="en-US" sz="2200" dirty="0" smtClean="0">
-                <a:latin typeface="Courier New" panose="02070309020205020404" pitchFamily="49" charset="0"/>
-                <a:cs typeface="Courier New" panose="02070309020205020404" pitchFamily="49" charset="0"/>
-              </a:rPr>
-              <a:t>   </a:t>
-            </a:r>
-            <a:r>
-              <a:rPr lang="en-US" sz="2200" dirty="0" err="1" smtClean="0">
-                <a:latin typeface="Courier New" panose="02070309020205020404" pitchFamily="49" charset="0"/>
-                <a:cs typeface="Courier New" panose="02070309020205020404" pitchFamily="49" charset="0"/>
-              </a:rPr>
-              <a:t>struct</a:t>
-            </a:r>
-            <a:r>
-              <a:rPr lang="en-US" sz="2200" dirty="0" smtClean="0">
-                <a:latin typeface="Courier New" panose="02070309020205020404" pitchFamily="49" charset="0"/>
-                <a:cs typeface="Courier New" panose="02070309020205020404" pitchFamily="49" charset="0"/>
-              </a:rPr>
-              <a:t> </a:t>
-            </a:r>
-            <a:r>
-              <a:rPr lang="en-US" sz="2200" dirty="0">
-                <a:latin typeface="Courier New" panose="02070309020205020404" pitchFamily="49" charset="0"/>
-                <a:cs typeface="Courier New" panose="02070309020205020404" pitchFamily="49" charset="0"/>
-              </a:rPr>
-              <a:t>node * new = </a:t>
-            </a:r>
-            <a:r>
-              <a:rPr lang="en-US" sz="2200" dirty="0" err="1">
-                <a:latin typeface="Courier New" panose="02070309020205020404" pitchFamily="49" charset="0"/>
-                <a:cs typeface="Courier New" panose="02070309020205020404" pitchFamily="49" charset="0"/>
-              </a:rPr>
-              <a:t>new_node</a:t>
-            </a:r>
-            <a:r>
-              <a:rPr lang="en-US" sz="2200" dirty="0" smtClean="0">
-                <a:latin typeface="Courier New" panose="02070309020205020404" pitchFamily="49" charset="0"/>
-                <a:cs typeface="Courier New" panose="02070309020205020404" pitchFamily="49" charset="0"/>
-              </a:rPr>
-              <a:t>();</a:t>
-            </a:r>
-            <a:br>
-              <a:rPr lang="en-US" sz="2200" dirty="0" smtClean="0">
-                <a:latin typeface="Courier New" panose="02070309020205020404" pitchFamily="49" charset="0"/>
-                <a:cs typeface="Courier New" panose="02070309020205020404" pitchFamily="49" charset="0"/>
-              </a:rPr>
-            </a:br>
-            <a:r>
-              <a:rPr lang="en-US" sz="2200" dirty="0" smtClean="0">
-                <a:latin typeface="Courier New" panose="02070309020205020404" pitchFamily="49" charset="0"/>
-                <a:cs typeface="Courier New" panose="02070309020205020404" pitchFamily="49" charset="0"/>
-              </a:rPr>
-              <a:t>   </a:t>
-            </a:r>
-            <a:r>
-              <a:rPr lang="en-US" sz="2200" dirty="0" smtClean="0">
-                <a:latin typeface="Courier New" panose="02070309020205020404" pitchFamily="49" charset="0"/>
-                <a:cs typeface="Courier New" panose="02070309020205020404" pitchFamily="49" charset="0"/>
-              </a:rPr>
-              <a:t>new-</a:t>
-            </a:r>
-            <a:r>
-              <a:rPr lang="en-US" sz="2200" dirty="0">
-                <a:latin typeface="Courier New" panose="02070309020205020404" pitchFamily="49" charset="0"/>
-                <a:cs typeface="Courier New" panose="02070309020205020404" pitchFamily="49" charset="0"/>
-              </a:rPr>
-              <a:t>&gt;</a:t>
-            </a:r>
-            <a:r>
-              <a:rPr lang="en-US" sz="2200" dirty="0" err="1" smtClean="0">
-                <a:latin typeface="Courier New" panose="02070309020205020404" pitchFamily="49" charset="0"/>
-                <a:cs typeface="Courier New" panose="02070309020205020404" pitchFamily="49" charset="0"/>
-              </a:rPr>
-              <a:t>val</a:t>
-            </a:r>
-            <a:r>
-              <a:rPr lang="en-US" sz="2200" dirty="0" smtClean="0">
-                <a:latin typeface="Courier New" panose="02070309020205020404" pitchFamily="49" charset="0"/>
-                <a:cs typeface="Courier New" panose="02070309020205020404" pitchFamily="49" charset="0"/>
-              </a:rPr>
-              <a:t>=</a:t>
-            </a:r>
-            <a:r>
-              <a:rPr lang="en-US" sz="2200" dirty="0" err="1" smtClean="0">
-                <a:latin typeface="Courier New" panose="02070309020205020404" pitchFamily="49" charset="0"/>
-                <a:cs typeface="Courier New" panose="02070309020205020404" pitchFamily="49" charset="0"/>
-              </a:rPr>
-              <a:t>newval</a:t>
-            </a:r>
-            <a:r>
-              <a:rPr lang="en-US" sz="2200" dirty="0" smtClean="0">
-                <a:latin typeface="Courier New" panose="02070309020205020404" pitchFamily="49" charset="0"/>
-                <a:cs typeface="Courier New" panose="02070309020205020404" pitchFamily="49" charset="0"/>
-              </a:rPr>
-              <a:t>;</a:t>
-            </a:r>
-            <a:br>
-              <a:rPr lang="en-US" sz="2200" dirty="0" smtClean="0">
-                <a:latin typeface="Courier New" panose="02070309020205020404" pitchFamily="49" charset="0"/>
-                <a:cs typeface="Courier New" panose="02070309020205020404" pitchFamily="49" charset="0"/>
-              </a:rPr>
-            </a:br>
-            <a:r>
-              <a:rPr lang="en-US" sz="2200" dirty="0" smtClean="0">
-                <a:latin typeface="Courier New" panose="02070309020205020404" pitchFamily="49" charset="0"/>
-                <a:cs typeface="Courier New" panose="02070309020205020404" pitchFamily="49" charset="0"/>
-              </a:rPr>
-              <a:t>   </a:t>
-            </a:r>
-            <a:r>
-              <a:rPr lang="en-US" sz="2200" dirty="0" err="1" smtClean="0">
-                <a:latin typeface="Courier New" panose="02070309020205020404" pitchFamily="49" charset="0"/>
-                <a:cs typeface="Courier New" panose="02070309020205020404" pitchFamily="49" charset="0"/>
-              </a:rPr>
-              <a:t>int</a:t>
-            </a:r>
-            <a:r>
-              <a:rPr lang="en-US" sz="2200" dirty="0" smtClean="0">
-                <a:latin typeface="Courier New" panose="02070309020205020404" pitchFamily="49" charset="0"/>
-                <a:cs typeface="Courier New" panose="02070309020205020404" pitchFamily="49" charset="0"/>
-              </a:rPr>
-              <a:t> </a:t>
-            </a:r>
-            <a:r>
-              <a:rPr lang="en-US" sz="2200" dirty="0" err="1">
-                <a:latin typeface="Courier New" panose="02070309020205020404" pitchFamily="49" charset="0"/>
-                <a:cs typeface="Courier New" panose="02070309020205020404" pitchFamily="49" charset="0"/>
-              </a:rPr>
-              <a:t>i</a:t>
-            </a:r>
-            <a:r>
-              <a:rPr lang="en-US" sz="2200" dirty="0">
-                <a:latin typeface="Courier New" panose="02070309020205020404" pitchFamily="49" charset="0"/>
-                <a:cs typeface="Courier New" panose="02070309020205020404" pitchFamily="49" charset="0"/>
-              </a:rPr>
-              <a:t>; </a:t>
-            </a:r>
-            <a:r>
-              <a:rPr lang="en-US" sz="2200" dirty="0" smtClean="0">
-                <a:latin typeface="Courier New" panose="02070309020205020404" pitchFamily="49" charset="0"/>
-                <a:cs typeface="Courier New" panose="02070309020205020404" pitchFamily="49" charset="0"/>
-              </a:rPr>
-              <a:t>  </a:t>
-            </a:r>
-            <a:r>
-              <a:rPr lang="en-US" sz="2200" dirty="0" smtClean="0">
-                <a:latin typeface="Bodoni MT" panose="02070603080606020203" pitchFamily="18" charset="0"/>
-                <a:cs typeface="Courier New" panose="02070309020205020404" pitchFamily="49" charset="0"/>
-              </a:rPr>
-              <a:t>// </a:t>
-            </a:r>
-            <a:r>
-              <a:rPr lang="en-US" sz="2200" dirty="0" err="1">
-                <a:latin typeface="Bodoni MT" panose="02070603080606020203" pitchFamily="18" charset="0"/>
-                <a:cs typeface="Courier New" panose="02070309020205020404" pitchFamily="49" charset="0"/>
-              </a:rPr>
-              <a:t>i</a:t>
-            </a:r>
-            <a:r>
-              <a:rPr lang="en-US" sz="2200" dirty="0">
-                <a:latin typeface="Bodoni MT" panose="02070603080606020203" pitchFamily="18" charset="0"/>
-                <a:cs typeface="Courier New" panose="02070309020205020404" pitchFamily="49" charset="0"/>
-              </a:rPr>
-              <a:t> is the position of l</a:t>
-            </a:r>
-          </a:p>
-          <a:p>
-            <a:pPr marL="0" indent="0">
-              <a:buNone/>
-            </a:pPr>
-            <a:r>
-              <a:rPr lang="en-US" sz="2200" dirty="0" smtClean="0">
-                <a:latin typeface="Courier New" panose="02070309020205020404" pitchFamily="49" charset="0"/>
-                <a:cs typeface="Courier New" panose="02070309020205020404" pitchFamily="49" charset="0"/>
-              </a:rPr>
-              <a:t>   </a:t>
-            </a:r>
-            <a:r>
-              <a:rPr lang="en-US" sz="2200" dirty="0" smtClean="0">
-                <a:latin typeface="Courier New" panose="02070309020205020404" pitchFamily="49" charset="0"/>
-                <a:cs typeface="Courier New" panose="02070309020205020404" pitchFamily="49" charset="0"/>
-              </a:rPr>
-              <a:t>  </a:t>
-            </a:r>
-            <a:r>
-              <a:rPr lang="en-US" sz="2200" dirty="0" smtClean="0">
-                <a:latin typeface="Bodoni MT" panose="02070603080606020203" pitchFamily="18" charset="0"/>
-                <a:cs typeface="Courier New" panose="02070309020205020404" pitchFamily="49" charset="0"/>
-              </a:rPr>
-              <a:t>// </a:t>
-            </a:r>
-            <a:r>
-              <a:rPr lang="en-US" sz="2200" dirty="0" smtClean="0">
-                <a:latin typeface="Bodoni MT" panose="02070603080606020203" pitchFamily="18" charset="0"/>
-                <a:cs typeface="Courier New" panose="02070309020205020404" pitchFamily="49" charset="0"/>
-              </a:rPr>
-              <a:t>@loop traverse the list looking for position</a:t>
-            </a:r>
-            <a:r>
-              <a:rPr lang="en-US" sz="2200" dirty="0" smtClean="0">
-                <a:latin typeface="Courier New" panose="02070309020205020404" pitchFamily="49" charset="0"/>
-                <a:cs typeface="Courier New" panose="02070309020205020404" pitchFamily="49" charset="0"/>
-              </a:rPr>
-              <a:t/>
-            </a:r>
-            <a:br>
-              <a:rPr lang="en-US" sz="2200" dirty="0" smtClean="0">
-                <a:latin typeface="Courier New" panose="02070309020205020404" pitchFamily="49" charset="0"/>
-                <a:cs typeface="Courier New" panose="02070309020205020404" pitchFamily="49" charset="0"/>
-              </a:rPr>
-            </a:br>
-            <a:r>
-              <a:rPr lang="en-US" sz="2200" dirty="0" smtClean="0">
-                <a:latin typeface="Courier New" panose="02070309020205020404" pitchFamily="49" charset="0"/>
-                <a:cs typeface="Courier New" panose="02070309020205020404" pitchFamily="49" charset="0"/>
-              </a:rPr>
-              <a:t>   for(l=head</a:t>
-            </a:r>
-            <a:r>
-              <a:rPr lang="en-US" sz="2200" dirty="0">
-                <a:latin typeface="Courier New" panose="02070309020205020404" pitchFamily="49" charset="0"/>
-                <a:cs typeface="Courier New" panose="02070309020205020404" pitchFamily="49" charset="0"/>
-              </a:rPr>
-              <a:t>, p=NULL, </a:t>
-            </a:r>
-            <a:r>
-              <a:rPr lang="en-US" sz="2200" dirty="0" err="1">
-                <a:latin typeface="Courier New" panose="02070309020205020404" pitchFamily="49" charset="0"/>
-                <a:cs typeface="Courier New" panose="02070309020205020404" pitchFamily="49" charset="0"/>
-              </a:rPr>
-              <a:t>i</a:t>
-            </a:r>
-            <a:r>
-              <a:rPr lang="en-US" sz="2200" dirty="0">
-                <a:latin typeface="Courier New" panose="02070309020205020404" pitchFamily="49" charset="0"/>
-                <a:cs typeface="Courier New" panose="02070309020205020404" pitchFamily="49" charset="0"/>
-              </a:rPr>
-              <a:t>=0; </a:t>
-            </a:r>
-            <a:r>
-              <a:rPr lang="en-US" sz="2200" b="1" dirty="0">
-                <a:solidFill>
-                  <a:schemeClr val="accent2"/>
-                </a:solidFill>
-                <a:latin typeface="Courier New" panose="02070309020205020404" pitchFamily="49" charset="0"/>
-                <a:cs typeface="Courier New" panose="02070309020205020404" pitchFamily="49" charset="0"/>
-              </a:rPr>
-              <a:t>l!= NULL &amp;&amp; </a:t>
-            </a:r>
-            <a:r>
-              <a:rPr lang="en-US" sz="2200" b="1" dirty="0" err="1">
-                <a:solidFill>
-                  <a:schemeClr val="accent2"/>
-                </a:solidFill>
-                <a:latin typeface="Courier New" panose="02070309020205020404" pitchFamily="49" charset="0"/>
-                <a:cs typeface="Courier New" panose="02070309020205020404" pitchFamily="49" charset="0"/>
-              </a:rPr>
-              <a:t>i</a:t>
-            </a:r>
-            <a:r>
-              <a:rPr lang="en-US" sz="2200" b="1" dirty="0">
-                <a:solidFill>
-                  <a:schemeClr val="accent2"/>
-                </a:solidFill>
-                <a:latin typeface="Courier New" panose="02070309020205020404" pitchFamily="49" charset="0"/>
-                <a:cs typeface="Courier New" panose="02070309020205020404" pitchFamily="49" charset="0"/>
-              </a:rPr>
-              <a:t> &lt; </a:t>
-            </a:r>
-            <a:r>
-              <a:rPr lang="en-US" sz="2200" b="1" dirty="0" err="1">
-                <a:solidFill>
-                  <a:schemeClr val="accent2"/>
-                </a:solidFill>
-                <a:latin typeface="Courier New" panose="02070309020205020404" pitchFamily="49" charset="0"/>
-                <a:cs typeface="Courier New" panose="02070309020205020404" pitchFamily="49" charset="0"/>
-              </a:rPr>
-              <a:t>pos</a:t>
-            </a:r>
-            <a:r>
-              <a:rPr lang="en-US" sz="2200" b="1" dirty="0">
-                <a:solidFill>
-                  <a:schemeClr val="accent2"/>
-                </a:solidFill>
-                <a:latin typeface="Courier New" panose="02070309020205020404" pitchFamily="49" charset="0"/>
-                <a:cs typeface="Courier New" panose="02070309020205020404" pitchFamily="49" charset="0"/>
-              </a:rPr>
-              <a:t> </a:t>
-            </a:r>
-            <a:r>
-              <a:rPr lang="en-US" sz="2200" dirty="0">
-                <a:latin typeface="Courier New" panose="02070309020205020404" pitchFamily="49" charset="0"/>
-                <a:cs typeface="Courier New" panose="02070309020205020404" pitchFamily="49" charset="0"/>
-              </a:rPr>
-              <a:t>; l=l-&gt;next, </a:t>
-            </a:r>
-            <a:r>
-              <a:rPr lang="en-US" sz="2200" dirty="0" err="1">
-                <a:latin typeface="Courier New" panose="02070309020205020404" pitchFamily="49" charset="0"/>
-                <a:cs typeface="Courier New" panose="02070309020205020404" pitchFamily="49" charset="0"/>
-              </a:rPr>
-              <a:t>i</a:t>
-            </a:r>
-            <a:r>
-              <a:rPr lang="en-US" sz="2200" dirty="0" smtClean="0">
-                <a:latin typeface="Courier New" panose="02070309020205020404" pitchFamily="49" charset="0"/>
-                <a:cs typeface="Courier New" panose="02070309020205020404" pitchFamily="49" charset="0"/>
-              </a:rPr>
-              <a:t>++)</a:t>
-            </a:r>
-            <a:br>
-              <a:rPr lang="en-US" sz="2200" dirty="0" smtClean="0">
-                <a:latin typeface="Courier New" panose="02070309020205020404" pitchFamily="49" charset="0"/>
-                <a:cs typeface="Courier New" panose="02070309020205020404" pitchFamily="49" charset="0"/>
-              </a:rPr>
-            </a:br>
-            <a:r>
-              <a:rPr lang="en-US" sz="2200" dirty="0" smtClean="0">
-                <a:latin typeface="Courier New" panose="02070309020205020404" pitchFamily="49" charset="0"/>
-                <a:cs typeface="Courier New" panose="02070309020205020404" pitchFamily="49" charset="0"/>
-              </a:rPr>
-              <a:t>         p=l</a:t>
-            </a:r>
-            <a:r>
-              <a:rPr lang="en-US" sz="2200" dirty="0" smtClean="0">
-                <a:latin typeface="Courier New" panose="02070309020205020404" pitchFamily="49" charset="0"/>
-                <a:cs typeface="Courier New" panose="02070309020205020404" pitchFamily="49" charset="0"/>
-              </a:rPr>
-              <a:t>;</a:t>
-            </a:r>
-          </a:p>
-          <a:p>
-            <a:pPr marL="0" indent="0">
-              <a:buNone/>
-            </a:pPr>
-            <a:r>
-              <a:rPr lang="en-US" sz="2200" dirty="0">
-                <a:latin typeface="Courier New" panose="02070309020205020404" pitchFamily="49" charset="0"/>
-                <a:cs typeface="Courier New" panose="02070309020205020404" pitchFamily="49" charset="0"/>
-              </a:rPr>
-              <a:t> </a:t>
-            </a:r>
-            <a:r>
-              <a:rPr lang="en-US" sz="2200" dirty="0" smtClean="0">
-                <a:latin typeface="Courier New" panose="02070309020205020404" pitchFamily="49" charset="0"/>
-                <a:cs typeface="Courier New" panose="02070309020205020404" pitchFamily="49" charset="0"/>
-              </a:rPr>
-              <a:t>    </a:t>
-            </a:r>
-            <a:r>
-              <a:rPr lang="en-US" sz="2200" dirty="0" smtClean="0">
-                <a:latin typeface="Bodoni MT" panose="02070603080606020203" pitchFamily="18" charset="0"/>
-                <a:cs typeface="Courier New" panose="02070309020205020404" pitchFamily="49" charset="0"/>
-              </a:rPr>
-              <a:t>// Now insert the new</a:t>
-            </a:r>
-            <a:endParaRPr lang="en-US" sz="2200" dirty="0">
-              <a:latin typeface="Bodoni MT" panose="02070603080606020203" pitchFamily="18" charset="0"/>
-              <a:cs typeface="Courier New" panose="02070309020205020404" pitchFamily="49" charset="0"/>
-            </a:endParaRPr>
-          </a:p>
-          <a:p>
-            <a:pPr marL="0" indent="0">
-              <a:buNone/>
-            </a:pPr>
-            <a:r>
-              <a:rPr lang="en-US" sz="2200" dirty="0" smtClean="0">
-                <a:latin typeface="Courier New" panose="02070309020205020404" pitchFamily="49" charset="0"/>
-                <a:cs typeface="Courier New" panose="02070309020205020404" pitchFamily="49" charset="0"/>
-              </a:rPr>
-              <a:t>   </a:t>
-            </a:r>
-            <a:r>
-              <a:rPr lang="en-US" sz="2200" dirty="0" smtClean="0">
-                <a:latin typeface="Courier New" panose="02070309020205020404" pitchFamily="49" charset="0"/>
-                <a:cs typeface="Courier New" panose="02070309020205020404" pitchFamily="49" charset="0"/>
-              </a:rPr>
-              <a:t>if </a:t>
-            </a:r>
-            <a:r>
-              <a:rPr lang="en-US" sz="2200" dirty="0">
-                <a:latin typeface="Courier New" panose="02070309020205020404" pitchFamily="49" charset="0"/>
-                <a:cs typeface="Courier New" panose="02070309020205020404" pitchFamily="49" charset="0"/>
-              </a:rPr>
-              <a:t>( p == NULL ) </a:t>
-            </a:r>
-            <a:r>
-              <a:rPr lang="en-US" sz="2200" dirty="0" smtClean="0">
-                <a:latin typeface="Courier New" panose="02070309020205020404" pitchFamily="49" charset="0"/>
-                <a:cs typeface="Courier New" panose="02070309020205020404" pitchFamily="49" charset="0"/>
-              </a:rPr>
-              <a:t>{     </a:t>
-            </a:r>
-            <a:r>
-              <a:rPr lang="en-US" sz="2200" dirty="0" smtClean="0">
-                <a:latin typeface="Bodoni MT" panose="02070603080606020203" pitchFamily="18" charset="0"/>
-                <a:cs typeface="Courier New" panose="02070309020205020404" pitchFamily="49" charset="0"/>
-              </a:rPr>
-              <a:t>// case of insert at the beginning</a:t>
-            </a:r>
-            <a:r>
-              <a:rPr lang="en-US" sz="2200" dirty="0" smtClean="0">
-                <a:latin typeface="Courier New" panose="02070309020205020404" pitchFamily="49" charset="0"/>
-                <a:cs typeface="Courier New" panose="02070309020205020404" pitchFamily="49" charset="0"/>
-              </a:rPr>
-              <a:t/>
-            </a:r>
-            <a:br>
-              <a:rPr lang="en-US" sz="2200" dirty="0" smtClean="0">
-                <a:latin typeface="Courier New" panose="02070309020205020404" pitchFamily="49" charset="0"/>
-                <a:cs typeface="Courier New" panose="02070309020205020404" pitchFamily="49" charset="0"/>
-              </a:rPr>
-            </a:br>
-            <a:r>
-              <a:rPr lang="en-US" sz="2200" dirty="0" smtClean="0">
-                <a:latin typeface="Courier New" panose="02070309020205020404" pitchFamily="49" charset="0"/>
-                <a:cs typeface="Courier New" panose="02070309020205020404" pitchFamily="49" charset="0"/>
-              </a:rPr>
-              <a:t>   </a:t>
-            </a:r>
-            <a:r>
-              <a:rPr lang="en-US" sz="2200" dirty="0" smtClean="0">
-                <a:latin typeface="Courier New" panose="02070309020205020404" pitchFamily="49" charset="0"/>
-                <a:cs typeface="Courier New" panose="02070309020205020404" pitchFamily="49" charset="0"/>
-              </a:rPr>
-              <a:t>      </a:t>
-            </a:r>
-            <a:r>
-              <a:rPr lang="en-US" sz="2200" dirty="0" smtClean="0">
-                <a:latin typeface="Courier New" panose="02070309020205020404" pitchFamily="49" charset="0"/>
-                <a:cs typeface="Courier New" panose="02070309020205020404" pitchFamily="49" charset="0"/>
-              </a:rPr>
-              <a:t>new-</a:t>
-            </a:r>
-            <a:r>
-              <a:rPr lang="en-US" sz="2200" dirty="0">
-                <a:latin typeface="Courier New" panose="02070309020205020404" pitchFamily="49" charset="0"/>
-                <a:cs typeface="Courier New" panose="02070309020205020404" pitchFamily="49" charset="0"/>
-              </a:rPr>
-              <a:t>&gt;next=head</a:t>
-            </a:r>
-            <a:r>
-              <a:rPr lang="en-US" sz="2200" dirty="0" smtClean="0">
-                <a:latin typeface="Courier New" panose="02070309020205020404" pitchFamily="49" charset="0"/>
-                <a:cs typeface="Courier New" panose="02070309020205020404" pitchFamily="49" charset="0"/>
-              </a:rPr>
-              <a:t>;</a:t>
-            </a:r>
-            <a:br>
-              <a:rPr lang="en-US" sz="2200" dirty="0" smtClean="0">
-                <a:latin typeface="Courier New" panose="02070309020205020404" pitchFamily="49" charset="0"/>
-                <a:cs typeface="Courier New" panose="02070309020205020404" pitchFamily="49" charset="0"/>
-              </a:rPr>
-            </a:br>
-            <a:r>
-              <a:rPr lang="en-US" sz="2200" dirty="0" smtClean="0">
-                <a:latin typeface="Courier New" panose="02070309020205020404" pitchFamily="49" charset="0"/>
-                <a:cs typeface="Courier New" panose="02070309020205020404" pitchFamily="49" charset="0"/>
-              </a:rPr>
-              <a:t>   </a:t>
-            </a:r>
-            <a:r>
-              <a:rPr lang="en-US" sz="2200" dirty="0" smtClean="0">
-                <a:latin typeface="Courier New" panose="02070309020205020404" pitchFamily="49" charset="0"/>
-                <a:cs typeface="Courier New" panose="02070309020205020404" pitchFamily="49" charset="0"/>
-              </a:rPr>
-              <a:t>      </a:t>
-            </a:r>
-            <a:r>
-              <a:rPr lang="en-US" sz="2200" dirty="0" smtClean="0">
-                <a:latin typeface="Courier New" panose="02070309020205020404" pitchFamily="49" charset="0"/>
-                <a:cs typeface="Courier New" panose="02070309020205020404" pitchFamily="49" charset="0"/>
-              </a:rPr>
-              <a:t>return </a:t>
-            </a:r>
-            <a:r>
-              <a:rPr lang="en-US" sz="2200" dirty="0">
-                <a:latin typeface="Courier New" panose="02070309020205020404" pitchFamily="49" charset="0"/>
-                <a:cs typeface="Courier New" panose="02070309020205020404" pitchFamily="49" charset="0"/>
-              </a:rPr>
-              <a:t>new</a:t>
-            </a:r>
-            <a:r>
-              <a:rPr lang="en-US" sz="2200" dirty="0" smtClean="0">
-                <a:latin typeface="Courier New" panose="02070309020205020404" pitchFamily="49" charset="0"/>
-                <a:cs typeface="Courier New" panose="02070309020205020404" pitchFamily="49" charset="0"/>
-              </a:rPr>
-              <a:t>;           </a:t>
-            </a:r>
-            <a:r>
-              <a:rPr lang="en-US" sz="2200" dirty="0" smtClean="0">
-                <a:latin typeface="Bodoni MT" panose="02070603080606020203" pitchFamily="18" charset="0"/>
-                <a:cs typeface="Courier New" panose="02070309020205020404" pitchFamily="49" charset="0"/>
-              </a:rPr>
-              <a:t>// and return the new bead</a:t>
-            </a:r>
-            <a:r>
-              <a:rPr lang="en-US" sz="2200" dirty="0" smtClean="0">
-                <a:latin typeface="Courier New" panose="02070309020205020404" pitchFamily="49" charset="0"/>
-                <a:cs typeface="Courier New" panose="02070309020205020404" pitchFamily="49" charset="0"/>
-              </a:rPr>
-              <a:t/>
-            </a:r>
-            <a:br>
-              <a:rPr lang="en-US" sz="2200" dirty="0" smtClean="0">
-                <a:latin typeface="Courier New" panose="02070309020205020404" pitchFamily="49" charset="0"/>
-                <a:cs typeface="Courier New" panose="02070309020205020404" pitchFamily="49" charset="0"/>
-              </a:rPr>
-            </a:br>
-            <a:r>
-              <a:rPr lang="en-US" sz="2200" dirty="0" smtClean="0">
-                <a:latin typeface="Courier New" panose="02070309020205020404" pitchFamily="49" charset="0"/>
-                <a:cs typeface="Courier New" panose="02070309020205020404" pitchFamily="49" charset="0"/>
-              </a:rPr>
-              <a:t>   </a:t>
-            </a:r>
-            <a:r>
-              <a:rPr lang="en-US" sz="2200" dirty="0" smtClean="0">
-                <a:latin typeface="Courier New" panose="02070309020205020404" pitchFamily="49" charset="0"/>
-                <a:cs typeface="Courier New" panose="02070309020205020404" pitchFamily="49" charset="0"/>
-              </a:rPr>
-              <a:t>}</a:t>
-            </a:r>
-            <a:endParaRPr lang="en-US" sz="2200" dirty="0">
+            <a:r>
+              <a:rPr lang="en-US" dirty="0" smtClean="0"/>
+              <a:t>See </a:t>
+            </a:r>
+            <a:r>
+              <a:rPr lang="en-US" dirty="0" err="1" smtClean="0">
+                <a:latin typeface="Courier New" panose="02070309020205020404" pitchFamily="49" charset="0"/>
+                <a:cs typeface="Courier New" panose="02070309020205020404" pitchFamily="49" charset="0"/>
+              </a:rPr>
+              <a:t>linked_list_intro.c</a:t>
+            </a:r>
+            <a:endParaRPr lang="en-US" dirty="0">
               <a:latin typeface="Courier New" panose="02070309020205020404" pitchFamily="49" charset="0"/>
               <a:cs typeface="Courier New" panose="02070309020205020404" pitchFamily="49" charset="0"/>
             </a:endParaRPr>
-          </a:p>
-          <a:p>
-            <a:pPr marL="0" indent="0">
-              <a:buNone/>
-            </a:pPr>
-            <a:r>
-              <a:rPr lang="en-US" sz="2200" dirty="0" smtClean="0">
-                <a:latin typeface="Courier New" panose="02070309020205020404" pitchFamily="49" charset="0"/>
-                <a:cs typeface="Courier New" panose="02070309020205020404" pitchFamily="49" charset="0"/>
-              </a:rPr>
-              <a:t>   </a:t>
-            </a:r>
-            <a:r>
-              <a:rPr lang="en-US" sz="2200" dirty="0" smtClean="0">
-                <a:latin typeface="Courier New" panose="02070309020205020404" pitchFamily="49" charset="0"/>
-                <a:cs typeface="Courier New" panose="02070309020205020404" pitchFamily="49" charset="0"/>
-              </a:rPr>
-              <a:t>new-</a:t>
-            </a:r>
-            <a:r>
-              <a:rPr lang="en-US" sz="2200" dirty="0">
-                <a:latin typeface="Courier New" panose="02070309020205020404" pitchFamily="49" charset="0"/>
-                <a:cs typeface="Courier New" panose="02070309020205020404" pitchFamily="49" charset="0"/>
-              </a:rPr>
-              <a:t>&gt;</a:t>
-            </a:r>
-            <a:r>
-              <a:rPr lang="en-US" sz="2200" dirty="0" smtClean="0">
-                <a:latin typeface="Courier New" panose="02070309020205020404" pitchFamily="49" charset="0"/>
-                <a:cs typeface="Courier New" panose="02070309020205020404" pitchFamily="49" charset="0"/>
-              </a:rPr>
-              <a:t>next=l</a:t>
-            </a:r>
-            <a:r>
-              <a:rPr lang="en-US" sz="2200" dirty="0" smtClean="0">
-                <a:latin typeface="Courier New" panose="02070309020205020404" pitchFamily="49" charset="0"/>
-                <a:cs typeface="Courier New" panose="02070309020205020404" pitchFamily="49" charset="0"/>
-              </a:rPr>
-              <a:t>;          </a:t>
-            </a:r>
-            <a:r>
-              <a:rPr lang="en-US" sz="2200" dirty="0" smtClean="0">
-                <a:latin typeface="Bodoni MT" panose="02070603080606020203" pitchFamily="18" charset="0"/>
-                <a:cs typeface="Courier New" panose="02070309020205020404" pitchFamily="49" charset="0"/>
-              </a:rPr>
-              <a:t> // now insert between p and l</a:t>
-            </a:r>
-            <a:r>
-              <a:rPr lang="en-US" sz="2200" dirty="0" smtClean="0">
-                <a:latin typeface="Courier New" panose="02070309020205020404" pitchFamily="49" charset="0"/>
-                <a:cs typeface="Courier New" panose="02070309020205020404" pitchFamily="49" charset="0"/>
-              </a:rPr>
-              <a:t/>
-            </a:r>
-            <a:br>
-              <a:rPr lang="en-US" sz="2200" dirty="0" smtClean="0">
-                <a:latin typeface="Courier New" panose="02070309020205020404" pitchFamily="49" charset="0"/>
-                <a:cs typeface="Courier New" panose="02070309020205020404" pitchFamily="49" charset="0"/>
-              </a:rPr>
-            </a:br>
-            <a:r>
-              <a:rPr lang="en-US" sz="2200" dirty="0" smtClean="0">
-                <a:latin typeface="Courier New" panose="02070309020205020404" pitchFamily="49" charset="0"/>
-                <a:cs typeface="Courier New" panose="02070309020205020404" pitchFamily="49" charset="0"/>
-              </a:rPr>
-              <a:t>   </a:t>
-            </a:r>
-            <a:r>
-              <a:rPr lang="en-US" sz="2200" dirty="0" smtClean="0">
-                <a:latin typeface="Courier New" panose="02070309020205020404" pitchFamily="49" charset="0"/>
-                <a:cs typeface="Courier New" panose="02070309020205020404" pitchFamily="49" charset="0"/>
-              </a:rPr>
-              <a:t>p-</a:t>
-            </a:r>
-            <a:r>
-              <a:rPr lang="en-US" sz="2200" dirty="0">
-                <a:latin typeface="Courier New" panose="02070309020205020404" pitchFamily="49" charset="0"/>
-                <a:cs typeface="Courier New" panose="02070309020205020404" pitchFamily="49" charset="0"/>
-              </a:rPr>
-              <a:t>&gt;next=new</a:t>
-            </a:r>
-            <a:r>
-              <a:rPr lang="en-US" sz="2200" dirty="0" smtClean="0">
-                <a:latin typeface="Courier New" panose="02070309020205020404" pitchFamily="49" charset="0"/>
-                <a:cs typeface="Courier New" panose="02070309020205020404" pitchFamily="49" charset="0"/>
-              </a:rPr>
-              <a:t>;</a:t>
-            </a:r>
-            <a:br>
-              <a:rPr lang="en-US" sz="2200" dirty="0" smtClean="0">
-                <a:latin typeface="Courier New" panose="02070309020205020404" pitchFamily="49" charset="0"/>
-                <a:cs typeface="Courier New" panose="02070309020205020404" pitchFamily="49" charset="0"/>
-              </a:rPr>
-            </a:br>
-            <a:r>
-              <a:rPr lang="en-US" sz="2200" dirty="0" smtClean="0">
-                <a:latin typeface="Courier New" panose="02070309020205020404" pitchFamily="49" charset="0"/>
-                <a:cs typeface="Courier New" panose="02070309020205020404" pitchFamily="49" charset="0"/>
-              </a:rPr>
-              <a:t>   </a:t>
-            </a:r>
-            <a:r>
-              <a:rPr lang="en-US" sz="2200" dirty="0" smtClean="0">
-                <a:latin typeface="Courier New" panose="02070309020205020404" pitchFamily="49" charset="0"/>
-                <a:cs typeface="Courier New" panose="02070309020205020404" pitchFamily="49" charset="0"/>
-              </a:rPr>
-              <a:t>return </a:t>
-            </a:r>
-            <a:r>
-              <a:rPr lang="en-US" sz="2200" dirty="0">
-                <a:latin typeface="Courier New" panose="02070309020205020404" pitchFamily="49" charset="0"/>
-                <a:cs typeface="Courier New" panose="02070309020205020404" pitchFamily="49" charset="0"/>
-              </a:rPr>
-              <a:t>head</a:t>
-            </a:r>
-            <a:r>
-              <a:rPr lang="en-US" sz="2200" dirty="0" smtClean="0">
-                <a:latin typeface="Courier New" panose="02070309020205020404" pitchFamily="49" charset="0"/>
-                <a:cs typeface="Courier New" panose="02070309020205020404" pitchFamily="49" charset="0"/>
-              </a:rPr>
-              <a:t>;                </a:t>
-            </a:r>
-            <a:r>
-              <a:rPr lang="en-US" sz="2200" dirty="0" smtClean="0">
-                <a:latin typeface="Bodoni MT" panose="02070603080606020203" pitchFamily="18" charset="0"/>
-                <a:cs typeface="Courier New" panose="02070309020205020404" pitchFamily="49" charset="0"/>
-              </a:rPr>
-              <a:t>// and return the old head</a:t>
-            </a:r>
-            <a:endParaRPr lang="en-US" sz="2200" dirty="0">
-              <a:latin typeface="Bodoni MT" panose="02070603080606020203" pitchFamily="18" charset="0"/>
-              <a:cs typeface="Courier New" panose="02070309020205020404" pitchFamily="49" charset="0"/>
-            </a:endParaRPr>
-          </a:p>
-          <a:p>
-            <a:pPr marL="0" indent="0">
-              <a:buNone/>
-            </a:pPr>
-            <a:r>
-              <a:rPr lang="en-US" sz="2200" dirty="0">
-                <a:latin typeface="Courier New" panose="02070309020205020404" pitchFamily="49" charset="0"/>
-                <a:cs typeface="Courier New" panose="02070309020205020404" pitchFamily="49" charset="0"/>
-              </a:rPr>
-              <a:t>}</a:t>
-            </a:r>
           </a:p>
         </p:txBody>
       </p:sp>
     </p:spTree>
     <p:extLst>
       <p:ext uri="{BB962C8B-B14F-4D97-AF65-F5344CB8AC3E}">
-        <p14:creationId xmlns:p14="http://schemas.microsoft.com/office/powerpoint/2010/main" val="1510937364"/>
+        <p14:creationId xmlns:p14="http://schemas.microsoft.com/office/powerpoint/2010/main" val="3374011401"/>
       </p:ext>
     </p:extLst>
   </p:cSld>
   <p:clrMapOvr>
     <a:masterClrMapping/>
   </p:clrMapOvr>
-  <p:timing>
-    <p:tnLst>
-      <p:par>
-        <p:cTn id="1" dur="indefinite" restart="never" nodeType="tmRoot">
-          <p:childTnLst>
-            <p:seq concurrent="1" nextAc="seek">
-              <p:cTn id="2" dur="indefinite" nodeType="mainSeq">
-                <p:childTnLst>
-                  <p:par>
-                    <p:cTn id="3" fill="hold">
-                      <p:stCondLst>
-                        <p:cond delay="indefinite"/>
-                      </p:stCondLst>
-                      <p:childTnLst>
-                        <p:par>
-                          <p:cTn id="4" fill="hold">
-                            <p:stCondLst>
-                              <p:cond delay="0"/>
-                            </p:stCondLst>
-                            <p:childTnLst>
-                              <p:par>
-                                <p:cTn id="5" presetID="1" presetClass="entr" presetSubtype="0" fill="hold" nodeType="clickEffect">
-                                  <p:stCondLst>
-                                    <p:cond delay="0"/>
-                                  </p:stCondLst>
-                                  <p:childTnLst>
-                                    <p:set>
-                                      <p:cBhvr>
-                                        <p:cTn id="6" dur="1" fill="hold">
-                                          <p:stCondLst>
-                                            <p:cond delay="0"/>
-                                          </p:stCondLst>
-                                        </p:cTn>
-                                        <p:tgtEl>
-                                          <p:spTgt spid="3">
-                                            <p:txEl>
-                                              <p:pRg st="1" end="1"/>
-                                            </p:txEl>
-                                          </p:spTgt>
-                                        </p:tgtEl>
-                                        <p:attrNameLst>
-                                          <p:attrName>style.visibility</p:attrName>
-                                        </p:attrNameLst>
-                                      </p:cBhvr>
-                                      <p:to>
-                                        <p:strVal val="visible"/>
-                                      </p:to>
-                                    </p:set>
-                                  </p:childTnLst>
-                                </p:cTn>
-                              </p:par>
-                            </p:childTnLst>
-                          </p:cTn>
-                        </p:par>
-                      </p:childTnLst>
-                    </p:cTn>
-                  </p:par>
-                  <p:par>
-                    <p:cTn id="7" fill="hold">
-                      <p:stCondLst>
-                        <p:cond delay="indefinite"/>
-                      </p:stCondLst>
-                      <p:childTnLst>
-                        <p:par>
-                          <p:cTn id="8" fill="hold">
-                            <p:stCondLst>
-                              <p:cond delay="0"/>
-                            </p:stCondLst>
-                            <p:childTnLst>
-                              <p:par>
-                                <p:cTn id="9" presetID="1" presetClass="entr" presetSubtype="0" fill="hold" nodeType="clickEffect">
-                                  <p:stCondLst>
-                                    <p:cond delay="0"/>
-                                  </p:stCondLst>
-                                  <p:childTnLst>
-                                    <p:set>
-                                      <p:cBhvr>
-                                        <p:cTn id="10" dur="1" fill="hold">
-                                          <p:stCondLst>
-                                            <p:cond delay="0"/>
-                                          </p:stCondLst>
-                                        </p:cTn>
-                                        <p:tgtEl>
-                                          <p:spTgt spid="3">
-                                            <p:txEl>
-                                              <p:pRg st="2" end="2"/>
-                                            </p:txEl>
-                                          </p:spTgt>
-                                        </p:tgtEl>
-                                        <p:attrNameLst>
-                                          <p:attrName>style.visibility</p:attrName>
-                                        </p:attrNameLst>
-                                      </p:cBhvr>
-                                      <p:to>
-                                        <p:strVal val="visible"/>
-                                      </p:to>
-                                    </p:set>
-                                  </p:childTnLst>
-                                </p:cTn>
-                              </p:par>
-                            </p:childTnLst>
-                          </p:cTn>
-                        </p:par>
-                      </p:childTnLst>
-                    </p:cTn>
-                  </p:par>
-                  <p:par>
-                    <p:cTn id="11" fill="hold">
-                      <p:stCondLst>
-                        <p:cond delay="indefinite"/>
-                      </p:stCondLst>
-                      <p:childTnLst>
-                        <p:par>
-                          <p:cTn id="12" fill="hold">
-                            <p:stCondLst>
-                              <p:cond delay="0"/>
-                            </p:stCondLst>
-                            <p:childTnLst>
-                              <p:par>
-                                <p:cTn id="13" presetID="1" presetClass="entr" presetSubtype="0" fill="hold" nodeType="clickEffect">
-                                  <p:stCondLst>
-                                    <p:cond delay="0"/>
-                                  </p:stCondLst>
-                                  <p:childTnLst>
-                                    <p:set>
-                                      <p:cBhvr>
-                                        <p:cTn id="14" dur="1" fill="hold">
-                                          <p:stCondLst>
-                                            <p:cond delay="0"/>
-                                          </p:stCondLst>
-                                        </p:cTn>
-                                        <p:tgtEl>
-                                          <p:spTgt spid="3">
-                                            <p:txEl>
-                                              <p:pRg st="3" end="3"/>
-                                            </p:txEl>
-                                          </p:spTgt>
-                                        </p:tgtEl>
-                                        <p:attrNameLst>
-                                          <p:attrName>style.visibility</p:attrName>
-                                        </p:attrNameLst>
-                                      </p:cBhvr>
-                                      <p:to>
-                                        <p:strVal val="visible"/>
-                                      </p:to>
-                                    </p:set>
-                                  </p:childTnLst>
-                                </p:cTn>
-                              </p:par>
-                            </p:childTnLst>
-                          </p:cTn>
-                        </p:par>
-                      </p:childTnLst>
-                    </p:cTn>
-                  </p:par>
-                  <p:par>
-                    <p:cTn id="15" fill="hold">
-                      <p:stCondLst>
-                        <p:cond delay="indefinite"/>
-                      </p:stCondLst>
-                      <p:childTnLst>
-                        <p:par>
-                          <p:cTn id="16" fill="hold">
-                            <p:stCondLst>
-                              <p:cond delay="0"/>
-                            </p:stCondLst>
-                            <p:childTnLst>
-                              <p:par>
-                                <p:cTn id="17" presetID="1" presetClass="entr" presetSubtype="0" fill="hold" nodeType="clickEffect">
-                                  <p:stCondLst>
-                                    <p:cond delay="0"/>
-                                  </p:stCondLst>
-                                  <p:childTnLst>
-                                    <p:set>
-                                      <p:cBhvr>
-                                        <p:cTn id="18" dur="1" fill="hold">
-                                          <p:stCondLst>
-                                            <p:cond delay="0"/>
-                                          </p:stCondLst>
-                                        </p:cTn>
-                                        <p:tgtEl>
-                                          <p:spTgt spid="3">
-                                            <p:txEl>
-                                              <p:pRg st="4" end="4"/>
-                                            </p:txEl>
-                                          </p:spTgt>
-                                        </p:tgtEl>
-                                        <p:attrNameLst>
-                                          <p:attrName>style.visibility</p:attrName>
-                                        </p:attrNameLst>
-                                      </p:cBhvr>
-                                      <p:to>
-                                        <p:strVal val="visible"/>
-                                      </p:to>
-                                    </p:set>
-                                  </p:childTnLst>
-                                </p:cTn>
-                              </p:par>
-                            </p:childTnLst>
-                          </p:cTn>
-                        </p:par>
-                      </p:childTnLst>
-                    </p:cTn>
-                  </p:par>
-                  <p:par>
-                    <p:cTn id="19" fill="hold">
-                      <p:stCondLst>
-                        <p:cond delay="indefinite"/>
-                      </p:stCondLst>
-                      <p:childTnLst>
-                        <p:par>
-                          <p:cTn id="20" fill="hold">
-                            <p:stCondLst>
-                              <p:cond delay="0"/>
-                            </p:stCondLst>
-                            <p:childTnLst>
-                              <p:par>
-                                <p:cTn id="21" presetID="1" presetClass="entr" presetSubtype="0" fill="hold" nodeType="clickEffect">
-                                  <p:stCondLst>
-                                    <p:cond delay="0"/>
-                                  </p:stCondLst>
-                                  <p:childTnLst>
-                                    <p:set>
-                                      <p:cBhvr>
-                                        <p:cTn id="22" dur="1" fill="hold">
-                                          <p:stCondLst>
-                                            <p:cond delay="0"/>
-                                          </p:stCondLst>
-                                        </p:cTn>
-                                        <p:tgtEl>
-                                          <p:spTgt spid="3">
-                                            <p:txEl>
-                                              <p:pRg st="5" end="5"/>
-                                            </p:txEl>
-                                          </p:spTgt>
-                                        </p:tgtEl>
-                                        <p:attrNameLst>
-                                          <p:attrName>style.visibility</p:attrName>
-                                        </p:attrNameLst>
-                                      </p:cBhvr>
-                                      <p:to>
-                                        <p:strVal val="visible"/>
-                                      </p:to>
-                                    </p:set>
-                                  </p:childTnLst>
-                                </p:cTn>
-                              </p:par>
-                            </p:childTnLst>
-                          </p:cTn>
-                        </p:par>
-                      </p:childTnLst>
-                    </p:cTn>
-                  </p:par>
-                </p:childTnLst>
-              </p:cTn>
-              <p:prevCondLst>
-                <p:cond evt="onPrev" delay="0">
-                  <p:tgtEl>
-                    <p:sldTgt/>
-                  </p:tgtEl>
-                </p:cond>
-              </p:prevCondLst>
-              <p:nextCondLst>
-                <p:cond evt="onNext" delay="0">
-                  <p:tgtEl>
-                    <p:sldTgt/>
-                  </p:tgtEl>
-                </p:cond>
-              </p:nextCondLst>
-            </p:seq>
-          </p:childTnLst>
-        </p:cTn>
-      </p:par>
-    </p:tnLst>
-  </p:timing>
 </p:sld>
 </file>
 
@@ -16577,14 +16467,19 @@
             <p:ph type="title"/>
           </p:nvPr>
         </p:nvSpPr>
-        <p:spPr/>
+        <p:spPr>
+          <a:xfrm>
+            <a:off x="838200" y="14935"/>
+            <a:ext cx="10515600" cy="1325563"/>
+          </a:xfrm>
+        </p:spPr>
         <p:txBody>
           <a:bodyPr/>
           <a:lstStyle/>
           <a:p>
             <a:r>
               <a:rPr lang="en-US" dirty="0" smtClean="0"/>
-              <a:t>Deleting from a position in a linked list</a:t>
+              <a:t>Inserting into a position in a linked list</a:t>
             </a:r>
             <a:endParaRPr lang="en-US" dirty="0"/>
           </a:p>
@@ -16602,7 +16497,7 @@
         </p:nvSpPr>
         <p:spPr>
           <a:xfrm>
-            <a:off x="507458" y="1397607"/>
+            <a:off x="507458" y="950142"/>
             <a:ext cx="11684542" cy="5956504"/>
           </a:xfrm>
         </p:spPr>
@@ -16616,83 +16511,632 @@
               <a:buNone/>
             </a:pPr>
             <a:r>
-              <a:rPr lang="en-US" sz="2000" dirty="0" err="1">
+              <a:rPr lang="en-US" sz="2200" dirty="0" err="1">
                 <a:latin typeface="Courier New" panose="02070309020205020404" pitchFamily="49" charset="0"/>
                 <a:cs typeface="Courier New" panose="02070309020205020404" pitchFamily="49" charset="0"/>
               </a:rPr>
               <a:t>struct</a:t>
             </a:r>
             <a:r>
-              <a:rPr lang="en-US" sz="2000" dirty="0">
+              <a:rPr lang="en-US" sz="2200" dirty="0">
                 <a:latin typeface="Courier New" panose="02070309020205020404" pitchFamily="49" charset="0"/>
                 <a:cs typeface="Courier New" panose="02070309020205020404" pitchFamily="49" charset="0"/>
               </a:rPr>
               <a:t> node * </a:t>
             </a:r>
             <a:r>
-              <a:rPr lang="en-US" sz="2000" dirty="0" err="1" smtClean="0">
-                <a:latin typeface="Courier New" panose="02070309020205020404" pitchFamily="49" charset="0"/>
-                <a:cs typeface="Courier New" panose="02070309020205020404" pitchFamily="49" charset="0"/>
-              </a:rPr>
-              <a:t>node_delete</a:t>
-            </a:r>
-            <a:r>
-              <a:rPr lang="en-US" sz="2000" dirty="0" smtClean="0">
+              <a:rPr lang="en-US" sz="2200" dirty="0" err="1">
+                <a:latin typeface="Courier New" panose="02070309020205020404" pitchFamily="49" charset="0"/>
+                <a:cs typeface="Courier New" panose="02070309020205020404" pitchFamily="49" charset="0"/>
+              </a:rPr>
+              <a:t>node_insert</a:t>
+            </a:r>
+            <a:r>
+              <a:rPr lang="en-US" sz="2200" dirty="0">
                 <a:latin typeface="Courier New" panose="02070309020205020404" pitchFamily="49" charset="0"/>
                 <a:cs typeface="Courier New" panose="02070309020205020404" pitchFamily="49" charset="0"/>
               </a:rPr>
               <a:t>(</a:t>
             </a:r>
             <a:r>
-              <a:rPr lang="en-US" sz="2000" dirty="0" err="1" smtClean="0">
+              <a:rPr lang="en-US" sz="2200" dirty="0" err="1">
                 <a:latin typeface="Courier New" panose="02070309020205020404" pitchFamily="49" charset="0"/>
                 <a:cs typeface="Courier New" panose="02070309020205020404" pitchFamily="49" charset="0"/>
               </a:rPr>
               <a:t>struct</a:t>
             </a:r>
             <a:r>
-              <a:rPr lang="en-US" sz="2000" dirty="0" smtClean="0">
+              <a:rPr lang="en-US" sz="2200" dirty="0">
+                <a:latin typeface="Courier New" panose="02070309020205020404" pitchFamily="49" charset="0"/>
+                <a:cs typeface="Courier New" panose="02070309020205020404" pitchFamily="49" charset="0"/>
+              </a:rPr>
+              <a:t> node * head, </a:t>
+            </a:r>
+            <a:r>
+              <a:rPr lang="en-US" sz="2200" dirty="0" err="1">
+                <a:latin typeface="Courier New" panose="02070309020205020404" pitchFamily="49" charset="0"/>
+                <a:cs typeface="Courier New" panose="02070309020205020404" pitchFamily="49" charset="0"/>
+              </a:rPr>
+              <a:t>int</a:t>
+            </a:r>
+            <a:r>
+              <a:rPr lang="en-US" sz="2200" dirty="0">
                 <a:latin typeface="Courier New" panose="02070309020205020404" pitchFamily="49" charset="0"/>
                 <a:cs typeface="Courier New" panose="02070309020205020404" pitchFamily="49" charset="0"/>
               </a:rPr>
               <a:t> </a:t>
             </a:r>
             <a:r>
-              <a:rPr lang="en-US" sz="2000" dirty="0">
-                <a:latin typeface="Courier New" panose="02070309020205020404" pitchFamily="49" charset="0"/>
-                <a:cs typeface="Courier New" panose="02070309020205020404" pitchFamily="49" charset="0"/>
-              </a:rPr>
-              <a:t>node * head, </a:t>
-            </a:r>
-            <a:r>
-              <a:rPr lang="en-US" sz="2000" dirty="0" err="1">
+              <a:rPr lang="en-US" sz="2200" dirty="0" err="1">
+                <a:latin typeface="Courier New" panose="02070309020205020404" pitchFamily="49" charset="0"/>
+                <a:cs typeface="Courier New" panose="02070309020205020404" pitchFamily="49" charset="0"/>
+              </a:rPr>
+              <a:t>pos</a:t>
+            </a:r>
+            <a:r>
+              <a:rPr lang="en-US" sz="2200" dirty="0">
+                <a:latin typeface="Courier New" panose="02070309020205020404" pitchFamily="49" charset="0"/>
+                <a:cs typeface="Courier New" panose="02070309020205020404" pitchFamily="49" charset="0"/>
+              </a:rPr>
+              <a:t>, </a:t>
+            </a:r>
+            <a:r>
+              <a:rPr lang="en-US" sz="2200" dirty="0" err="1">
                 <a:latin typeface="Courier New" panose="02070309020205020404" pitchFamily="49" charset="0"/>
                 <a:cs typeface="Courier New" panose="02070309020205020404" pitchFamily="49" charset="0"/>
               </a:rPr>
               <a:t>int</a:t>
             </a:r>
             <a:r>
-              <a:rPr lang="en-US" sz="2000" dirty="0">
+              <a:rPr lang="en-US" sz="2200" dirty="0">
                 <a:latin typeface="Courier New" panose="02070309020205020404" pitchFamily="49" charset="0"/>
                 <a:cs typeface="Courier New" panose="02070309020205020404" pitchFamily="49" charset="0"/>
               </a:rPr>
               <a:t> </a:t>
             </a:r>
             <a:r>
-              <a:rPr lang="en-US" sz="2000" dirty="0" err="1" smtClean="0">
+              <a:rPr lang="en-US" sz="2200" dirty="0" err="1">
+                <a:latin typeface="Courier New" panose="02070309020205020404" pitchFamily="49" charset="0"/>
+                <a:cs typeface="Courier New" panose="02070309020205020404" pitchFamily="49" charset="0"/>
+              </a:rPr>
+              <a:t>newval</a:t>
+            </a:r>
+            <a:r>
+              <a:rPr lang="en-US" sz="2200" dirty="0">
+                <a:latin typeface="Courier New" panose="02070309020205020404" pitchFamily="49" charset="0"/>
+                <a:cs typeface="Courier New" panose="02070309020205020404" pitchFamily="49" charset="0"/>
+              </a:rPr>
+              <a:t>){</a:t>
+            </a:r>
+          </a:p>
+          <a:p>
+            <a:pPr marL="0" indent="0">
+              <a:buNone/>
+            </a:pPr>
+            <a:r>
+              <a:rPr lang="en-US" sz="2200" dirty="0" smtClean="0">
+                <a:latin typeface="Courier New" panose="02070309020205020404" pitchFamily="49" charset="0"/>
+                <a:cs typeface="Courier New" panose="02070309020205020404" pitchFamily="49" charset="0"/>
+              </a:rPr>
+              <a:t>   </a:t>
+            </a:r>
+            <a:r>
+              <a:rPr lang="en-US" sz="2200" dirty="0" err="1" smtClean="0">
+                <a:latin typeface="Courier New" panose="02070309020205020404" pitchFamily="49" charset="0"/>
+                <a:cs typeface="Courier New" panose="02070309020205020404" pitchFamily="49" charset="0"/>
+              </a:rPr>
+              <a:t>struct</a:t>
+            </a:r>
+            <a:r>
+              <a:rPr lang="en-US" sz="2200" dirty="0" smtClean="0">
+                <a:latin typeface="Courier New" panose="02070309020205020404" pitchFamily="49" charset="0"/>
+                <a:cs typeface="Courier New" panose="02070309020205020404" pitchFamily="49" charset="0"/>
+              </a:rPr>
+              <a:t> </a:t>
+            </a:r>
+            <a:r>
+              <a:rPr lang="en-US" sz="2200" dirty="0">
+                <a:latin typeface="Courier New" panose="02070309020205020404" pitchFamily="49" charset="0"/>
+                <a:cs typeface="Courier New" panose="02070309020205020404" pitchFamily="49" charset="0"/>
+              </a:rPr>
+              <a:t>node * l, * p</a:t>
+            </a:r>
+            <a:r>
+              <a:rPr lang="en-US" sz="2200" dirty="0" smtClean="0">
+                <a:latin typeface="Courier New" panose="02070309020205020404" pitchFamily="49" charset="0"/>
+                <a:cs typeface="Courier New" panose="02070309020205020404" pitchFamily="49" charset="0"/>
+              </a:rPr>
+              <a:t>;   </a:t>
+            </a:r>
+            <a:r>
+              <a:rPr lang="en-US" sz="2200" dirty="0" smtClean="0">
+                <a:latin typeface="Bodoni MT" panose="02070603080606020203" pitchFamily="18" charset="0"/>
+                <a:cs typeface="Courier New" panose="02070309020205020404" pitchFamily="49" charset="0"/>
+              </a:rPr>
+              <a:t>// we need two positions to insert between</a:t>
+            </a:r>
+            <a:r>
+              <a:rPr lang="en-US" sz="2200" dirty="0" smtClean="0">
+                <a:latin typeface="Courier New" panose="02070309020205020404" pitchFamily="49" charset="0"/>
+                <a:cs typeface="Courier New" panose="02070309020205020404" pitchFamily="49" charset="0"/>
+              </a:rPr>
+              <a:t> </a:t>
+            </a:r>
+            <a:r>
+              <a:rPr lang="en-US" sz="2200" dirty="0">
+                <a:latin typeface="Courier New" panose="02070309020205020404" pitchFamily="49" charset="0"/>
+                <a:cs typeface="Courier New" panose="02070309020205020404" pitchFamily="49" charset="0"/>
+              </a:rPr>
+              <a:t>	</a:t>
+            </a:r>
+            <a:r>
+              <a:rPr lang="en-US" sz="2200" dirty="0" smtClean="0">
+                <a:latin typeface="Courier New" panose="02070309020205020404" pitchFamily="49" charset="0"/>
+                <a:cs typeface="Courier New" panose="02070309020205020404" pitchFamily="49" charset="0"/>
+              </a:rPr>
+              <a:t/>
+            </a:r>
+            <a:br>
+              <a:rPr lang="en-US" sz="2200" dirty="0" smtClean="0">
+                <a:latin typeface="Courier New" panose="02070309020205020404" pitchFamily="49" charset="0"/>
+                <a:cs typeface="Courier New" panose="02070309020205020404" pitchFamily="49" charset="0"/>
+              </a:rPr>
+            </a:br>
+            <a:r>
+              <a:rPr lang="en-US" sz="2200" dirty="0" smtClean="0">
+                <a:latin typeface="Courier New" panose="02070309020205020404" pitchFamily="49" charset="0"/>
+                <a:cs typeface="Courier New" panose="02070309020205020404" pitchFamily="49" charset="0"/>
+              </a:rPr>
+              <a:t>   </a:t>
+            </a:r>
+            <a:r>
+              <a:rPr lang="en-US" sz="2200" dirty="0" err="1" smtClean="0">
+                <a:latin typeface="Courier New" panose="02070309020205020404" pitchFamily="49" charset="0"/>
+                <a:cs typeface="Courier New" panose="02070309020205020404" pitchFamily="49" charset="0"/>
+              </a:rPr>
+              <a:t>struct</a:t>
+            </a:r>
+            <a:r>
+              <a:rPr lang="en-US" sz="2200" dirty="0" smtClean="0">
+                <a:latin typeface="Courier New" panose="02070309020205020404" pitchFamily="49" charset="0"/>
+                <a:cs typeface="Courier New" panose="02070309020205020404" pitchFamily="49" charset="0"/>
+              </a:rPr>
+              <a:t> </a:t>
+            </a:r>
+            <a:r>
+              <a:rPr lang="en-US" sz="2200" dirty="0">
+                <a:latin typeface="Courier New" panose="02070309020205020404" pitchFamily="49" charset="0"/>
+                <a:cs typeface="Courier New" panose="02070309020205020404" pitchFamily="49" charset="0"/>
+              </a:rPr>
+              <a:t>node * new = </a:t>
+            </a:r>
+            <a:r>
+              <a:rPr lang="en-US" sz="2200" dirty="0" err="1">
+                <a:latin typeface="Courier New" panose="02070309020205020404" pitchFamily="49" charset="0"/>
+                <a:cs typeface="Courier New" panose="02070309020205020404" pitchFamily="49" charset="0"/>
+              </a:rPr>
+              <a:t>new_node</a:t>
+            </a:r>
+            <a:r>
+              <a:rPr lang="en-US" sz="2200" dirty="0" smtClean="0">
+                <a:latin typeface="Courier New" panose="02070309020205020404" pitchFamily="49" charset="0"/>
+                <a:cs typeface="Courier New" panose="02070309020205020404" pitchFamily="49" charset="0"/>
+              </a:rPr>
+              <a:t>();</a:t>
+            </a:r>
+            <a:br>
+              <a:rPr lang="en-US" sz="2200" dirty="0" smtClean="0">
+                <a:latin typeface="Courier New" panose="02070309020205020404" pitchFamily="49" charset="0"/>
+                <a:cs typeface="Courier New" panose="02070309020205020404" pitchFamily="49" charset="0"/>
+              </a:rPr>
+            </a:br>
+            <a:r>
+              <a:rPr lang="en-US" sz="2200" dirty="0" smtClean="0">
+                <a:latin typeface="Courier New" panose="02070309020205020404" pitchFamily="49" charset="0"/>
+                <a:cs typeface="Courier New" panose="02070309020205020404" pitchFamily="49" charset="0"/>
+              </a:rPr>
+              <a:t>   new-</a:t>
+            </a:r>
+            <a:r>
+              <a:rPr lang="en-US" sz="2200" dirty="0">
+                <a:latin typeface="Courier New" panose="02070309020205020404" pitchFamily="49" charset="0"/>
+                <a:cs typeface="Courier New" panose="02070309020205020404" pitchFamily="49" charset="0"/>
+              </a:rPr>
+              <a:t>&gt;</a:t>
+            </a:r>
+            <a:r>
+              <a:rPr lang="en-US" sz="2200" dirty="0" err="1" smtClean="0">
+                <a:latin typeface="Courier New" panose="02070309020205020404" pitchFamily="49" charset="0"/>
+                <a:cs typeface="Courier New" panose="02070309020205020404" pitchFamily="49" charset="0"/>
+              </a:rPr>
+              <a:t>val</a:t>
+            </a:r>
+            <a:r>
+              <a:rPr lang="en-US" sz="2200" dirty="0" smtClean="0">
+                <a:latin typeface="Courier New" panose="02070309020205020404" pitchFamily="49" charset="0"/>
+                <a:cs typeface="Courier New" panose="02070309020205020404" pitchFamily="49" charset="0"/>
+              </a:rPr>
+              <a:t>=</a:t>
+            </a:r>
+            <a:r>
+              <a:rPr lang="en-US" sz="2200" dirty="0" err="1" smtClean="0">
+                <a:latin typeface="Courier New" panose="02070309020205020404" pitchFamily="49" charset="0"/>
+                <a:cs typeface="Courier New" panose="02070309020205020404" pitchFamily="49" charset="0"/>
+              </a:rPr>
+              <a:t>newval</a:t>
+            </a:r>
+            <a:r>
+              <a:rPr lang="en-US" sz="2200" dirty="0" smtClean="0">
+                <a:latin typeface="Courier New" panose="02070309020205020404" pitchFamily="49" charset="0"/>
+                <a:cs typeface="Courier New" panose="02070309020205020404" pitchFamily="49" charset="0"/>
+              </a:rPr>
+              <a:t>;</a:t>
+            </a:r>
+            <a:br>
+              <a:rPr lang="en-US" sz="2200" dirty="0" smtClean="0">
+                <a:latin typeface="Courier New" panose="02070309020205020404" pitchFamily="49" charset="0"/>
+                <a:cs typeface="Courier New" panose="02070309020205020404" pitchFamily="49" charset="0"/>
+              </a:rPr>
+            </a:br>
+            <a:r>
+              <a:rPr lang="en-US" sz="2200" dirty="0" smtClean="0">
+                <a:latin typeface="Courier New" panose="02070309020205020404" pitchFamily="49" charset="0"/>
+                <a:cs typeface="Courier New" panose="02070309020205020404" pitchFamily="49" charset="0"/>
+              </a:rPr>
+              <a:t>   </a:t>
+            </a:r>
+            <a:r>
+              <a:rPr lang="en-US" sz="2200" dirty="0" err="1" smtClean="0">
+                <a:latin typeface="Courier New" panose="02070309020205020404" pitchFamily="49" charset="0"/>
+                <a:cs typeface="Courier New" panose="02070309020205020404" pitchFamily="49" charset="0"/>
+              </a:rPr>
+              <a:t>int</a:t>
+            </a:r>
+            <a:r>
+              <a:rPr lang="en-US" sz="2200" dirty="0" smtClean="0">
+                <a:latin typeface="Courier New" panose="02070309020205020404" pitchFamily="49" charset="0"/>
+                <a:cs typeface="Courier New" panose="02070309020205020404" pitchFamily="49" charset="0"/>
+              </a:rPr>
+              <a:t> </a:t>
+            </a:r>
+            <a:r>
+              <a:rPr lang="en-US" sz="2200" dirty="0" err="1">
+                <a:latin typeface="Courier New" panose="02070309020205020404" pitchFamily="49" charset="0"/>
+                <a:cs typeface="Courier New" panose="02070309020205020404" pitchFamily="49" charset="0"/>
+              </a:rPr>
+              <a:t>i</a:t>
+            </a:r>
+            <a:r>
+              <a:rPr lang="en-US" sz="2200" dirty="0">
+                <a:latin typeface="Courier New" panose="02070309020205020404" pitchFamily="49" charset="0"/>
+                <a:cs typeface="Courier New" panose="02070309020205020404" pitchFamily="49" charset="0"/>
+              </a:rPr>
+              <a:t>; </a:t>
+            </a:r>
+            <a:r>
+              <a:rPr lang="en-US" sz="2200" dirty="0" smtClean="0">
+                <a:latin typeface="Courier New" panose="02070309020205020404" pitchFamily="49" charset="0"/>
+                <a:cs typeface="Courier New" panose="02070309020205020404" pitchFamily="49" charset="0"/>
+              </a:rPr>
+              <a:t>  </a:t>
+            </a:r>
+            <a:r>
+              <a:rPr lang="en-US" sz="2200" dirty="0" smtClean="0">
+                <a:latin typeface="Bodoni MT" panose="02070603080606020203" pitchFamily="18" charset="0"/>
+                <a:cs typeface="Courier New" panose="02070309020205020404" pitchFamily="49" charset="0"/>
+              </a:rPr>
+              <a:t>// </a:t>
+            </a:r>
+            <a:r>
+              <a:rPr lang="en-US" sz="2200" dirty="0" err="1">
+                <a:latin typeface="Bodoni MT" panose="02070603080606020203" pitchFamily="18" charset="0"/>
+                <a:cs typeface="Courier New" panose="02070309020205020404" pitchFamily="49" charset="0"/>
+              </a:rPr>
+              <a:t>i</a:t>
+            </a:r>
+            <a:r>
+              <a:rPr lang="en-US" sz="2200" dirty="0">
+                <a:latin typeface="Bodoni MT" panose="02070603080606020203" pitchFamily="18" charset="0"/>
+                <a:cs typeface="Courier New" panose="02070309020205020404" pitchFamily="49" charset="0"/>
+              </a:rPr>
+              <a:t> is the position of l</a:t>
+            </a:r>
+          </a:p>
+          <a:p>
+            <a:pPr marL="0" indent="0">
+              <a:buNone/>
+            </a:pPr>
+            <a:r>
+              <a:rPr lang="en-US" sz="2200" dirty="0" smtClean="0">
+                <a:latin typeface="Courier New" panose="02070309020205020404" pitchFamily="49" charset="0"/>
+                <a:cs typeface="Courier New" panose="02070309020205020404" pitchFamily="49" charset="0"/>
+              </a:rPr>
+              <a:t>     </a:t>
+            </a:r>
+            <a:r>
+              <a:rPr lang="en-US" sz="2200" dirty="0" smtClean="0">
+                <a:latin typeface="Bodoni MT" panose="02070603080606020203" pitchFamily="18" charset="0"/>
+                <a:cs typeface="Courier New" panose="02070309020205020404" pitchFamily="49" charset="0"/>
+              </a:rPr>
+              <a:t>// @loop traverse the list looking for position</a:t>
+            </a:r>
+            <a:r>
+              <a:rPr lang="en-US" sz="2200" dirty="0" smtClean="0">
+                <a:latin typeface="Courier New" panose="02070309020205020404" pitchFamily="49" charset="0"/>
+                <a:cs typeface="Courier New" panose="02070309020205020404" pitchFamily="49" charset="0"/>
+              </a:rPr>
+              <a:t/>
+            </a:r>
+            <a:br>
+              <a:rPr lang="en-US" sz="2200" dirty="0" smtClean="0">
+                <a:latin typeface="Courier New" panose="02070309020205020404" pitchFamily="49" charset="0"/>
+                <a:cs typeface="Courier New" panose="02070309020205020404" pitchFamily="49" charset="0"/>
+              </a:rPr>
+            </a:br>
+            <a:r>
+              <a:rPr lang="en-US" sz="2200" dirty="0" smtClean="0">
+                <a:latin typeface="Courier New" panose="02070309020205020404" pitchFamily="49" charset="0"/>
+                <a:cs typeface="Courier New" panose="02070309020205020404" pitchFamily="49" charset="0"/>
+              </a:rPr>
+              <a:t>   for(l=head</a:t>
+            </a:r>
+            <a:r>
+              <a:rPr lang="en-US" sz="2200" dirty="0">
+                <a:latin typeface="Courier New" panose="02070309020205020404" pitchFamily="49" charset="0"/>
+                <a:cs typeface="Courier New" panose="02070309020205020404" pitchFamily="49" charset="0"/>
+              </a:rPr>
+              <a:t>, p=NULL, </a:t>
+            </a:r>
+            <a:r>
+              <a:rPr lang="en-US" sz="2200" dirty="0" err="1">
+                <a:latin typeface="Courier New" panose="02070309020205020404" pitchFamily="49" charset="0"/>
+                <a:cs typeface="Courier New" panose="02070309020205020404" pitchFamily="49" charset="0"/>
+              </a:rPr>
+              <a:t>i</a:t>
+            </a:r>
+            <a:r>
+              <a:rPr lang="en-US" sz="2200" dirty="0">
+                <a:latin typeface="Courier New" panose="02070309020205020404" pitchFamily="49" charset="0"/>
+                <a:cs typeface="Courier New" panose="02070309020205020404" pitchFamily="49" charset="0"/>
+              </a:rPr>
+              <a:t>=0; </a:t>
+            </a:r>
+            <a:r>
+              <a:rPr lang="en-US" sz="2200" b="1" dirty="0">
+                <a:solidFill>
+                  <a:schemeClr val="accent2"/>
+                </a:solidFill>
+                <a:latin typeface="Courier New" panose="02070309020205020404" pitchFamily="49" charset="0"/>
+                <a:cs typeface="Courier New" panose="02070309020205020404" pitchFamily="49" charset="0"/>
+              </a:rPr>
+              <a:t>l!= NULL &amp;&amp; </a:t>
+            </a:r>
+            <a:r>
+              <a:rPr lang="en-US" sz="2200" b="1" dirty="0" err="1">
+                <a:solidFill>
+                  <a:schemeClr val="accent2"/>
+                </a:solidFill>
+                <a:latin typeface="Courier New" panose="02070309020205020404" pitchFamily="49" charset="0"/>
+                <a:cs typeface="Courier New" panose="02070309020205020404" pitchFamily="49" charset="0"/>
+              </a:rPr>
+              <a:t>i</a:t>
+            </a:r>
+            <a:r>
+              <a:rPr lang="en-US" sz="2200" b="1" dirty="0">
+                <a:solidFill>
+                  <a:schemeClr val="accent2"/>
+                </a:solidFill>
+                <a:latin typeface="Courier New" panose="02070309020205020404" pitchFamily="49" charset="0"/>
+                <a:cs typeface="Courier New" panose="02070309020205020404" pitchFamily="49" charset="0"/>
+              </a:rPr>
+              <a:t> &lt; </a:t>
+            </a:r>
+            <a:r>
+              <a:rPr lang="en-US" sz="2200" b="1" dirty="0" err="1">
+                <a:solidFill>
+                  <a:schemeClr val="accent2"/>
+                </a:solidFill>
                 <a:latin typeface="Courier New" panose="02070309020205020404" pitchFamily="49" charset="0"/>
                 <a:cs typeface="Courier New" panose="02070309020205020404" pitchFamily="49" charset="0"/>
               </a:rPr>
               <a:t>pos</a:t>
             </a:r>
             <a:r>
-              <a:rPr lang="en-US" sz="2000" dirty="0" smtClean="0">
-                <a:latin typeface="Courier New" panose="02070309020205020404" pitchFamily="49" charset="0"/>
-                <a:cs typeface="Courier New" panose="02070309020205020404" pitchFamily="49" charset="0"/>
-              </a:rPr>
-              <a:t>){</a:t>
-            </a:r>
-            <a:endParaRPr lang="en-US" sz="2000" dirty="0">
+              <a:rPr lang="en-US" sz="2200" b="1" dirty="0">
+                <a:solidFill>
+                  <a:schemeClr val="accent2"/>
+                </a:solidFill>
+                <a:latin typeface="Courier New" panose="02070309020205020404" pitchFamily="49" charset="0"/>
+                <a:cs typeface="Courier New" panose="02070309020205020404" pitchFamily="49" charset="0"/>
+              </a:rPr>
+              <a:t> </a:t>
+            </a:r>
+            <a:r>
+              <a:rPr lang="en-US" sz="2200" dirty="0">
+                <a:latin typeface="Courier New" panose="02070309020205020404" pitchFamily="49" charset="0"/>
+                <a:cs typeface="Courier New" panose="02070309020205020404" pitchFamily="49" charset="0"/>
+              </a:rPr>
+              <a:t>; l=l-&gt;next, </a:t>
+            </a:r>
+            <a:r>
+              <a:rPr lang="en-US" sz="2200" dirty="0" err="1">
+                <a:latin typeface="Courier New" panose="02070309020205020404" pitchFamily="49" charset="0"/>
+                <a:cs typeface="Courier New" panose="02070309020205020404" pitchFamily="49" charset="0"/>
+              </a:rPr>
+              <a:t>i</a:t>
+            </a:r>
+            <a:r>
+              <a:rPr lang="en-US" sz="2200" dirty="0" smtClean="0">
+                <a:latin typeface="Courier New" panose="02070309020205020404" pitchFamily="49" charset="0"/>
+                <a:cs typeface="Courier New" panose="02070309020205020404" pitchFamily="49" charset="0"/>
+              </a:rPr>
+              <a:t>++)</a:t>
+            </a:r>
+            <a:br>
+              <a:rPr lang="en-US" sz="2200" dirty="0" smtClean="0">
+                <a:latin typeface="Courier New" panose="02070309020205020404" pitchFamily="49" charset="0"/>
+                <a:cs typeface="Courier New" panose="02070309020205020404" pitchFamily="49" charset="0"/>
+              </a:rPr>
+            </a:br>
+            <a:r>
+              <a:rPr lang="en-US" sz="2200" dirty="0" smtClean="0">
+                <a:latin typeface="Courier New" panose="02070309020205020404" pitchFamily="49" charset="0"/>
+                <a:cs typeface="Courier New" panose="02070309020205020404" pitchFamily="49" charset="0"/>
+              </a:rPr>
+              <a:t>         p=l;</a:t>
+            </a:r>
+          </a:p>
+          <a:p>
+            <a:pPr marL="0" indent="0">
+              <a:buNone/>
+            </a:pPr>
+            <a:r>
+              <a:rPr lang="en-US" sz="2200" dirty="0">
+                <a:latin typeface="Courier New" panose="02070309020205020404" pitchFamily="49" charset="0"/>
+                <a:cs typeface="Courier New" panose="02070309020205020404" pitchFamily="49" charset="0"/>
+              </a:rPr>
+              <a:t> </a:t>
+            </a:r>
+            <a:r>
+              <a:rPr lang="en-US" sz="2200" dirty="0" smtClean="0">
+                <a:latin typeface="Courier New" panose="02070309020205020404" pitchFamily="49" charset="0"/>
+                <a:cs typeface="Courier New" panose="02070309020205020404" pitchFamily="49" charset="0"/>
+              </a:rPr>
+              <a:t>    </a:t>
+            </a:r>
+            <a:r>
+              <a:rPr lang="en-US" sz="2200" dirty="0" smtClean="0">
+                <a:latin typeface="Bodoni MT" panose="02070603080606020203" pitchFamily="18" charset="0"/>
+                <a:cs typeface="Courier New" panose="02070309020205020404" pitchFamily="49" charset="0"/>
+              </a:rPr>
+              <a:t>// Now insert the new</a:t>
+            </a:r>
+            <a:endParaRPr lang="en-US" sz="2200" dirty="0">
+              <a:latin typeface="Bodoni MT" panose="02070603080606020203" pitchFamily="18" charset="0"/>
+              <a:cs typeface="Courier New" panose="02070309020205020404" pitchFamily="49" charset="0"/>
+            </a:endParaRPr>
+          </a:p>
+          <a:p>
+            <a:pPr marL="0" indent="0">
+              <a:buNone/>
+            </a:pPr>
+            <a:r>
+              <a:rPr lang="en-US" sz="2200" dirty="0" smtClean="0">
+                <a:latin typeface="Courier New" panose="02070309020205020404" pitchFamily="49" charset="0"/>
+                <a:cs typeface="Courier New" panose="02070309020205020404" pitchFamily="49" charset="0"/>
+              </a:rPr>
+              <a:t>   if </a:t>
+            </a:r>
+            <a:r>
+              <a:rPr lang="en-US" sz="2200" dirty="0">
+                <a:latin typeface="Courier New" panose="02070309020205020404" pitchFamily="49" charset="0"/>
+                <a:cs typeface="Courier New" panose="02070309020205020404" pitchFamily="49" charset="0"/>
+              </a:rPr>
+              <a:t>( p == NULL ) </a:t>
+            </a:r>
+            <a:r>
+              <a:rPr lang="en-US" sz="2200" dirty="0" smtClean="0">
+                <a:latin typeface="Courier New" panose="02070309020205020404" pitchFamily="49" charset="0"/>
+                <a:cs typeface="Courier New" panose="02070309020205020404" pitchFamily="49" charset="0"/>
+              </a:rPr>
+              <a:t>{     </a:t>
+            </a:r>
+            <a:r>
+              <a:rPr lang="en-US" sz="2200" dirty="0" smtClean="0">
+                <a:latin typeface="Bodoni MT" panose="02070603080606020203" pitchFamily="18" charset="0"/>
+                <a:cs typeface="Courier New" panose="02070309020205020404" pitchFamily="49" charset="0"/>
+              </a:rPr>
+              <a:t>// case of insert at the beginning</a:t>
+            </a:r>
+            <a:r>
+              <a:rPr lang="en-US" sz="2200" dirty="0" smtClean="0">
+                <a:latin typeface="Courier New" panose="02070309020205020404" pitchFamily="49" charset="0"/>
+                <a:cs typeface="Courier New" panose="02070309020205020404" pitchFamily="49" charset="0"/>
+              </a:rPr>
+              <a:t/>
+            </a:r>
+            <a:br>
+              <a:rPr lang="en-US" sz="2200" dirty="0" smtClean="0">
+                <a:latin typeface="Courier New" panose="02070309020205020404" pitchFamily="49" charset="0"/>
+                <a:cs typeface="Courier New" panose="02070309020205020404" pitchFamily="49" charset="0"/>
+              </a:rPr>
+            </a:br>
+            <a:r>
+              <a:rPr lang="en-US" sz="2200" dirty="0" smtClean="0">
+                <a:latin typeface="Courier New" panose="02070309020205020404" pitchFamily="49" charset="0"/>
+                <a:cs typeface="Courier New" panose="02070309020205020404" pitchFamily="49" charset="0"/>
+              </a:rPr>
+              <a:t>         new-</a:t>
+            </a:r>
+            <a:r>
+              <a:rPr lang="en-US" sz="2200" dirty="0">
+                <a:latin typeface="Courier New" panose="02070309020205020404" pitchFamily="49" charset="0"/>
+                <a:cs typeface="Courier New" panose="02070309020205020404" pitchFamily="49" charset="0"/>
+              </a:rPr>
+              <a:t>&gt;next=head</a:t>
+            </a:r>
+            <a:r>
+              <a:rPr lang="en-US" sz="2200" dirty="0" smtClean="0">
+                <a:latin typeface="Courier New" panose="02070309020205020404" pitchFamily="49" charset="0"/>
+                <a:cs typeface="Courier New" panose="02070309020205020404" pitchFamily="49" charset="0"/>
+              </a:rPr>
+              <a:t>;</a:t>
+            </a:r>
+            <a:br>
+              <a:rPr lang="en-US" sz="2200" dirty="0" smtClean="0">
+                <a:latin typeface="Courier New" panose="02070309020205020404" pitchFamily="49" charset="0"/>
+                <a:cs typeface="Courier New" panose="02070309020205020404" pitchFamily="49" charset="0"/>
+              </a:rPr>
+            </a:br>
+            <a:r>
+              <a:rPr lang="en-US" sz="2200" dirty="0" smtClean="0">
+                <a:latin typeface="Courier New" panose="02070309020205020404" pitchFamily="49" charset="0"/>
+                <a:cs typeface="Courier New" panose="02070309020205020404" pitchFamily="49" charset="0"/>
+              </a:rPr>
+              <a:t>         return </a:t>
+            </a:r>
+            <a:r>
+              <a:rPr lang="en-US" sz="2200" dirty="0">
+                <a:latin typeface="Courier New" panose="02070309020205020404" pitchFamily="49" charset="0"/>
+                <a:cs typeface="Courier New" panose="02070309020205020404" pitchFamily="49" charset="0"/>
+              </a:rPr>
+              <a:t>new</a:t>
+            </a:r>
+            <a:r>
+              <a:rPr lang="en-US" sz="2200" dirty="0" smtClean="0">
+                <a:latin typeface="Courier New" panose="02070309020205020404" pitchFamily="49" charset="0"/>
+                <a:cs typeface="Courier New" panose="02070309020205020404" pitchFamily="49" charset="0"/>
+              </a:rPr>
+              <a:t>;           </a:t>
+            </a:r>
+            <a:r>
+              <a:rPr lang="en-US" sz="2200" dirty="0" smtClean="0">
+                <a:latin typeface="Bodoni MT" panose="02070603080606020203" pitchFamily="18" charset="0"/>
+                <a:cs typeface="Courier New" panose="02070309020205020404" pitchFamily="49" charset="0"/>
+              </a:rPr>
+              <a:t>// and return the new bead</a:t>
+            </a:r>
+            <a:r>
+              <a:rPr lang="en-US" sz="2200" dirty="0" smtClean="0">
+                <a:latin typeface="Courier New" panose="02070309020205020404" pitchFamily="49" charset="0"/>
+                <a:cs typeface="Courier New" panose="02070309020205020404" pitchFamily="49" charset="0"/>
+              </a:rPr>
+              <a:t/>
+            </a:r>
+            <a:br>
+              <a:rPr lang="en-US" sz="2200" dirty="0" smtClean="0">
+                <a:latin typeface="Courier New" panose="02070309020205020404" pitchFamily="49" charset="0"/>
+                <a:cs typeface="Courier New" panose="02070309020205020404" pitchFamily="49" charset="0"/>
+              </a:rPr>
+            </a:br>
+            <a:r>
+              <a:rPr lang="en-US" sz="2200" dirty="0" smtClean="0">
+                <a:latin typeface="Courier New" panose="02070309020205020404" pitchFamily="49" charset="0"/>
+                <a:cs typeface="Courier New" panose="02070309020205020404" pitchFamily="49" charset="0"/>
+              </a:rPr>
+              <a:t>   }</a:t>
+            </a:r>
+            <a:endParaRPr lang="en-US" sz="2200" dirty="0">
               <a:latin typeface="Courier New" panose="02070309020205020404" pitchFamily="49" charset="0"/>
               <a:cs typeface="Courier New" panose="02070309020205020404" pitchFamily="49" charset="0"/>
             </a:endParaRPr>
@@ -16702,630 +17146,112 @@
               <a:buNone/>
             </a:pPr>
             <a:r>
-              <a:rPr lang="en-US" sz="2000" dirty="0" smtClean="0">
-                <a:latin typeface="Courier New" panose="02070309020205020404" pitchFamily="49" charset="0"/>
-                <a:cs typeface="Courier New" panose="02070309020205020404" pitchFamily="49" charset="0"/>
-              </a:rPr>
-              <a:t>   </a:t>
-            </a:r>
-            <a:r>
-              <a:rPr lang="en-US" sz="2000" dirty="0" err="1" smtClean="0">
-                <a:latin typeface="Courier New" panose="02070309020205020404" pitchFamily="49" charset="0"/>
-                <a:cs typeface="Courier New" panose="02070309020205020404" pitchFamily="49" charset="0"/>
-              </a:rPr>
-              <a:t>struct</a:t>
-            </a:r>
-            <a:r>
-              <a:rPr lang="en-US" sz="2000" dirty="0" smtClean="0">
-                <a:latin typeface="Courier New" panose="02070309020205020404" pitchFamily="49" charset="0"/>
-                <a:cs typeface="Courier New" panose="02070309020205020404" pitchFamily="49" charset="0"/>
-              </a:rPr>
-              <a:t> </a:t>
-            </a:r>
-            <a:r>
-              <a:rPr lang="en-US" sz="2000" dirty="0">
-                <a:latin typeface="Courier New" panose="02070309020205020404" pitchFamily="49" charset="0"/>
-                <a:cs typeface="Courier New" panose="02070309020205020404" pitchFamily="49" charset="0"/>
-              </a:rPr>
-              <a:t>node * l, * p</a:t>
-            </a:r>
-            <a:r>
-              <a:rPr lang="en-US" sz="2000" dirty="0" smtClean="0">
-                <a:latin typeface="Courier New" panose="02070309020205020404" pitchFamily="49" charset="0"/>
-                <a:cs typeface="Courier New" panose="02070309020205020404" pitchFamily="49" charset="0"/>
-              </a:rPr>
-              <a:t>;    </a:t>
-            </a:r>
-            <a:r>
-              <a:rPr lang="en-US" sz="2000" dirty="0">
-                <a:latin typeface="Courier New" panose="02070309020205020404" pitchFamily="49" charset="0"/>
-                <a:cs typeface="Courier New" panose="02070309020205020404" pitchFamily="49" charset="0"/>
-              </a:rPr>
-              <a:t>	</a:t>
-            </a:r>
-            <a:r>
-              <a:rPr lang="en-US" sz="2000" dirty="0" smtClean="0">
+              <a:rPr lang="en-US" sz="2200" dirty="0" smtClean="0">
+                <a:latin typeface="Courier New" panose="02070309020205020404" pitchFamily="49" charset="0"/>
+                <a:cs typeface="Courier New" panose="02070309020205020404" pitchFamily="49" charset="0"/>
+              </a:rPr>
+              <a:t>   new-</a:t>
+            </a:r>
+            <a:r>
+              <a:rPr lang="en-US" sz="2200" dirty="0">
+                <a:latin typeface="Courier New" panose="02070309020205020404" pitchFamily="49" charset="0"/>
+                <a:cs typeface="Courier New" panose="02070309020205020404" pitchFamily="49" charset="0"/>
+              </a:rPr>
+              <a:t>&gt;</a:t>
+            </a:r>
+            <a:r>
+              <a:rPr lang="en-US" sz="2200" dirty="0" smtClean="0">
+                <a:latin typeface="Courier New" panose="02070309020205020404" pitchFamily="49" charset="0"/>
+                <a:cs typeface="Courier New" panose="02070309020205020404" pitchFamily="49" charset="0"/>
+              </a:rPr>
+              <a:t>next=l;          </a:t>
+            </a:r>
+            <a:r>
+              <a:rPr lang="en-US" sz="2200" dirty="0" smtClean="0">
+                <a:latin typeface="Bodoni MT" panose="02070603080606020203" pitchFamily="18" charset="0"/>
+                <a:cs typeface="Courier New" panose="02070309020205020404" pitchFamily="49" charset="0"/>
+              </a:rPr>
+              <a:t> // now insert between p and l</a:t>
+            </a:r>
+            <a:r>
+              <a:rPr lang="en-US" sz="2200" dirty="0" smtClean="0">
                 <a:latin typeface="Courier New" panose="02070309020205020404" pitchFamily="49" charset="0"/>
                 <a:cs typeface="Courier New" panose="02070309020205020404" pitchFamily="49" charset="0"/>
               </a:rPr>
               <a:t/>
             </a:r>
             <a:br>
-              <a:rPr lang="en-US" sz="2000" dirty="0" smtClean="0">
+              <a:rPr lang="en-US" sz="2200" dirty="0" smtClean="0">
                 <a:latin typeface="Courier New" panose="02070309020205020404" pitchFamily="49" charset="0"/>
                 <a:cs typeface="Courier New" panose="02070309020205020404" pitchFamily="49" charset="0"/>
               </a:rPr>
             </a:br>
             <a:r>
-              <a:rPr lang="en-US" sz="2000" dirty="0" smtClean="0">
-                <a:latin typeface="Courier New" panose="02070309020205020404" pitchFamily="49" charset="0"/>
-                <a:cs typeface="Courier New" panose="02070309020205020404" pitchFamily="49" charset="0"/>
-              </a:rPr>
-              <a:t>   </a:t>
-            </a:r>
-            <a:r>
-              <a:rPr lang="en-US" sz="2000" dirty="0" err="1" smtClean="0">
-                <a:latin typeface="Courier New" panose="02070309020205020404" pitchFamily="49" charset="0"/>
-                <a:cs typeface="Courier New" panose="02070309020205020404" pitchFamily="49" charset="0"/>
-              </a:rPr>
-              <a:t>int</a:t>
-            </a:r>
-            <a:r>
-              <a:rPr lang="en-US" sz="2000" dirty="0" smtClean="0">
-                <a:latin typeface="Courier New" panose="02070309020205020404" pitchFamily="49" charset="0"/>
-                <a:cs typeface="Courier New" panose="02070309020205020404" pitchFamily="49" charset="0"/>
-              </a:rPr>
-              <a:t> </a:t>
-            </a:r>
-            <a:r>
-              <a:rPr lang="en-US" sz="2000" dirty="0" err="1">
-                <a:latin typeface="Courier New" panose="02070309020205020404" pitchFamily="49" charset="0"/>
-                <a:cs typeface="Courier New" panose="02070309020205020404" pitchFamily="49" charset="0"/>
-              </a:rPr>
-              <a:t>i</a:t>
-            </a:r>
-            <a:r>
-              <a:rPr lang="en-US" sz="2000" dirty="0">
-                <a:latin typeface="Courier New" panose="02070309020205020404" pitchFamily="49" charset="0"/>
-                <a:cs typeface="Courier New" panose="02070309020205020404" pitchFamily="49" charset="0"/>
-              </a:rPr>
-              <a:t>; </a:t>
-            </a:r>
-            <a:r>
-              <a:rPr lang="en-US" sz="2000" dirty="0" smtClean="0">
-                <a:latin typeface="Courier New" panose="02070309020205020404" pitchFamily="49" charset="0"/>
-                <a:cs typeface="Courier New" panose="02070309020205020404" pitchFamily="49" charset="0"/>
-              </a:rPr>
-              <a:t>  </a:t>
-            </a:r>
-            <a:r>
-              <a:rPr lang="en-US" sz="2000" dirty="0" smtClean="0">
+              <a:rPr lang="en-US" sz="2200" dirty="0" smtClean="0">
+                <a:latin typeface="Courier New" panose="02070309020205020404" pitchFamily="49" charset="0"/>
+                <a:cs typeface="Courier New" panose="02070309020205020404" pitchFamily="49" charset="0"/>
+              </a:rPr>
+              <a:t>   p-</a:t>
+            </a:r>
+            <a:r>
+              <a:rPr lang="en-US" sz="2200" dirty="0">
+                <a:latin typeface="Courier New" panose="02070309020205020404" pitchFamily="49" charset="0"/>
+                <a:cs typeface="Courier New" panose="02070309020205020404" pitchFamily="49" charset="0"/>
+              </a:rPr>
+              <a:t>&gt;next=new</a:t>
+            </a:r>
+            <a:r>
+              <a:rPr lang="en-US" sz="2200" dirty="0" smtClean="0">
+                <a:latin typeface="Courier New" panose="02070309020205020404" pitchFamily="49" charset="0"/>
+                <a:cs typeface="Courier New" panose="02070309020205020404" pitchFamily="49" charset="0"/>
+              </a:rPr>
+              <a:t>;</a:t>
+            </a:r>
+            <a:br>
+              <a:rPr lang="en-US" sz="2200" dirty="0" smtClean="0">
+                <a:latin typeface="Courier New" panose="02070309020205020404" pitchFamily="49" charset="0"/>
+                <a:cs typeface="Courier New" panose="02070309020205020404" pitchFamily="49" charset="0"/>
+              </a:rPr>
+            </a:br>
+            <a:r>
+              <a:rPr lang="en-US" sz="2200" dirty="0" smtClean="0">
+                <a:latin typeface="Courier New" panose="02070309020205020404" pitchFamily="49" charset="0"/>
+                <a:cs typeface="Courier New" panose="02070309020205020404" pitchFamily="49" charset="0"/>
+              </a:rPr>
+              <a:t>   return </a:t>
+            </a:r>
+            <a:r>
+              <a:rPr lang="en-US" sz="2200" dirty="0">
+                <a:latin typeface="Courier New" panose="02070309020205020404" pitchFamily="49" charset="0"/>
+                <a:cs typeface="Courier New" panose="02070309020205020404" pitchFamily="49" charset="0"/>
+              </a:rPr>
+              <a:t>head</a:t>
+            </a:r>
+            <a:r>
+              <a:rPr lang="en-US" sz="2200" dirty="0" smtClean="0">
+                <a:latin typeface="Courier New" panose="02070309020205020404" pitchFamily="49" charset="0"/>
+                <a:cs typeface="Courier New" panose="02070309020205020404" pitchFamily="49" charset="0"/>
+              </a:rPr>
+              <a:t>;                </a:t>
+            </a:r>
+            <a:r>
+              <a:rPr lang="en-US" sz="2200" dirty="0" smtClean="0">
                 <a:latin typeface="Bodoni MT" panose="02070603080606020203" pitchFamily="18" charset="0"/>
                 <a:cs typeface="Courier New" panose="02070309020205020404" pitchFamily="49" charset="0"/>
               </a:rPr>
-              <a:t>// </a:t>
-            </a:r>
-            <a:r>
-              <a:rPr lang="en-US" sz="2000" dirty="0" err="1">
-                <a:latin typeface="Bodoni MT" panose="02070603080606020203" pitchFamily="18" charset="0"/>
-                <a:cs typeface="Courier New" panose="02070309020205020404" pitchFamily="49" charset="0"/>
-              </a:rPr>
-              <a:t>i</a:t>
-            </a:r>
-            <a:r>
-              <a:rPr lang="en-US" sz="2000" dirty="0">
-                <a:latin typeface="Bodoni MT" panose="02070603080606020203" pitchFamily="18" charset="0"/>
-                <a:cs typeface="Courier New" panose="02070309020205020404" pitchFamily="49" charset="0"/>
-              </a:rPr>
-              <a:t> is the position of l</a:t>
-            </a:r>
+              <a:t>// and return the old head</a:t>
+            </a:r>
+            <a:endParaRPr lang="en-US" sz="2200" dirty="0">
+              <a:latin typeface="Bodoni MT" panose="02070603080606020203" pitchFamily="18" charset="0"/>
+              <a:cs typeface="Courier New" panose="02070309020205020404" pitchFamily="49" charset="0"/>
+            </a:endParaRPr>
           </a:p>
           <a:p>
             <a:pPr marL="0" indent="0">
               <a:buNone/>
             </a:pPr>
             <a:r>
-              <a:rPr lang="en-US" sz="2000" dirty="0" smtClean="0">
-                <a:latin typeface="Courier New" panose="02070309020205020404" pitchFamily="49" charset="0"/>
-                <a:cs typeface="Courier New" panose="02070309020205020404" pitchFamily="49" charset="0"/>
-              </a:rPr>
-              <a:t>   </a:t>
-            </a:r>
-            <a:r>
-              <a:rPr lang="en-US" sz="2000" dirty="0" smtClean="0">
-                <a:latin typeface="Courier New" panose="02070309020205020404" pitchFamily="49" charset="0"/>
-                <a:cs typeface="Courier New" panose="02070309020205020404" pitchFamily="49" charset="0"/>
-              </a:rPr>
-              <a:t>      </a:t>
-            </a:r>
-            <a:r>
-              <a:rPr lang="en-US" sz="2000" dirty="0" smtClean="0">
-                <a:latin typeface="Bodoni MT" panose="02070603080606020203" pitchFamily="18" charset="0"/>
-                <a:cs typeface="Courier New" panose="02070309020205020404" pitchFamily="49" charset="0"/>
-              </a:rPr>
-              <a:t>// </a:t>
-            </a:r>
-            <a:r>
-              <a:rPr lang="en-US" sz="2000" dirty="0" smtClean="0">
-                <a:latin typeface="Bodoni MT" panose="02070603080606020203" pitchFamily="18" charset="0"/>
-                <a:cs typeface="Courier New" panose="02070309020205020404" pitchFamily="49" charset="0"/>
-              </a:rPr>
-              <a:t>@loop traverse the list looking for position</a:t>
-            </a:r>
-            <a:r>
-              <a:rPr lang="en-US" sz="2000" dirty="0" smtClean="0">
-                <a:latin typeface="Courier New" panose="02070309020205020404" pitchFamily="49" charset="0"/>
-                <a:cs typeface="Courier New" panose="02070309020205020404" pitchFamily="49" charset="0"/>
-              </a:rPr>
-              <a:t/>
-            </a:r>
-            <a:br>
-              <a:rPr lang="en-US" sz="2000" dirty="0" smtClean="0">
-                <a:latin typeface="Courier New" panose="02070309020205020404" pitchFamily="49" charset="0"/>
-                <a:cs typeface="Courier New" panose="02070309020205020404" pitchFamily="49" charset="0"/>
-              </a:rPr>
-            </a:br>
-            <a:r>
-              <a:rPr lang="en-US" sz="2000" dirty="0" smtClean="0">
-                <a:latin typeface="Courier New" panose="02070309020205020404" pitchFamily="49" charset="0"/>
-                <a:cs typeface="Courier New" panose="02070309020205020404" pitchFamily="49" charset="0"/>
-              </a:rPr>
-              <a:t>   for(l=head</a:t>
-            </a:r>
-            <a:r>
-              <a:rPr lang="en-US" sz="2000" dirty="0">
-                <a:latin typeface="Courier New" panose="02070309020205020404" pitchFamily="49" charset="0"/>
-                <a:cs typeface="Courier New" panose="02070309020205020404" pitchFamily="49" charset="0"/>
-              </a:rPr>
-              <a:t>, p=NULL, </a:t>
-            </a:r>
-            <a:r>
-              <a:rPr lang="en-US" sz="2000" dirty="0" err="1">
-                <a:latin typeface="Courier New" panose="02070309020205020404" pitchFamily="49" charset="0"/>
-                <a:cs typeface="Courier New" panose="02070309020205020404" pitchFamily="49" charset="0"/>
-              </a:rPr>
-              <a:t>i</a:t>
-            </a:r>
-            <a:r>
-              <a:rPr lang="en-US" sz="2000" dirty="0">
-                <a:latin typeface="Courier New" panose="02070309020205020404" pitchFamily="49" charset="0"/>
-                <a:cs typeface="Courier New" panose="02070309020205020404" pitchFamily="49" charset="0"/>
-              </a:rPr>
-              <a:t>=0; l!= NULL &amp;&amp; </a:t>
-            </a:r>
-            <a:r>
-              <a:rPr lang="en-US" sz="2000" dirty="0" err="1">
-                <a:latin typeface="Courier New" panose="02070309020205020404" pitchFamily="49" charset="0"/>
-                <a:cs typeface="Courier New" panose="02070309020205020404" pitchFamily="49" charset="0"/>
-              </a:rPr>
-              <a:t>i</a:t>
-            </a:r>
-            <a:r>
-              <a:rPr lang="en-US" sz="2000" dirty="0">
-                <a:latin typeface="Courier New" panose="02070309020205020404" pitchFamily="49" charset="0"/>
-                <a:cs typeface="Courier New" panose="02070309020205020404" pitchFamily="49" charset="0"/>
-              </a:rPr>
-              <a:t> &lt; </a:t>
-            </a:r>
-            <a:r>
-              <a:rPr lang="en-US" sz="2000" dirty="0" err="1">
-                <a:latin typeface="Courier New" panose="02070309020205020404" pitchFamily="49" charset="0"/>
-                <a:cs typeface="Courier New" panose="02070309020205020404" pitchFamily="49" charset="0"/>
-              </a:rPr>
-              <a:t>pos</a:t>
-            </a:r>
-            <a:r>
-              <a:rPr lang="en-US" sz="2000" dirty="0">
-                <a:latin typeface="Courier New" panose="02070309020205020404" pitchFamily="49" charset="0"/>
-                <a:cs typeface="Courier New" panose="02070309020205020404" pitchFamily="49" charset="0"/>
-              </a:rPr>
-              <a:t> ; l=l-&gt;next, </a:t>
-            </a:r>
-            <a:r>
-              <a:rPr lang="en-US" sz="2000" dirty="0" err="1">
-                <a:latin typeface="Courier New" panose="02070309020205020404" pitchFamily="49" charset="0"/>
-                <a:cs typeface="Courier New" panose="02070309020205020404" pitchFamily="49" charset="0"/>
-              </a:rPr>
-              <a:t>i</a:t>
-            </a:r>
-            <a:r>
-              <a:rPr lang="en-US" sz="2000" dirty="0" smtClean="0">
-                <a:latin typeface="Courier New" panose="02070309020205020404" pitchFamily="49" charset="0"/>
-                <a:cs typeface="Courier New" panose="02070309020205020404" pitchFamily="49" charset="0"/>
-              </a:rPr>
-              <a:t>++)</a:t>
-            </a:r>
-            <a:br>
-              <a:rPr lang="en-US" sz="2000" dirty="0" smtClean="0">
-                <a:latin typeface="Courier New" panose="02070309020205020404" pitchFamily="49" charset="0"/>
-                <a:cs typeface="Courier New" panose="02070309020205020404" pitchFamily="49" charset="0"/>
-              </a:rPr>
-            </a:br>
-            <a:r>
-              <a:rPr lang="en-US" sz="2000" dirty="0" smtClean="0">
-                <a:latin typeface="Courier New" panose="02070309020205020404" pitchFamily="49" charset="0"/>
-                <a:cs typeface="Courier New" panose="02070309020205020404" pitchFamily="49" charset="0"/>
-              </a:rPr>
-              <a:t>         p=l;</a:t>
-            </a:r>
-            <a:endParaRPr lang="en-US" sz="2000" dirty="0">
-              <a:latin typeface="Courier New" panose="02070309020205020404" pitchFamily="49" charset="0"/>
-              <a:cs typeface="Courier New" panose="02070309020205020404" pitchFamily="49" charset="0"/>
-            </a:endParaRPr>
-          </a:p>
-          <a:p>
-            <a:pPr marL="0" indent="0">
-              <a:buNone/>
-            </a:pPr>
-            <a:r>
-              <a:rPr lang="en-US" sz="2000" dirty="0" smtClean="0">
-                <a:latin typeface="Courier New" panose="02070309020205020404" pitchFamily="49" charset="0"/>
-                <a:cs typeface="Courier New" panose="02070309020205020404" pitchFamily="49" charset="0"/>
-              </a:rPr>
-              <a:t>   </a:t>
-            </a:r>
-            <a:r>
-              <a:rPr lang="en-US" sz="2000" dirty="0" smtClean="0">
-                <a:latin typeface="Courier New" panose="02070309020205020404" pitchFamily="49" charset="0"/>
-                <a:cs typeface="Courier New" panose="02070309020205020404" pitchFamily="49" charset="0"/>
-              </a:rPr>
-              <a:t>if </a:t>
-            </a:r>
-            <a:r>
-              <a:rPr lang="en-US" sz="2000" dirty="0">
-                <a:latin typeface="Courier New" panose="02070309020205020404" pitchFamily="49" charset="0"/>
-                <a:cs typeface="Courier New" panose="02070309020205020404" pitchFamily="49" charset="0"/>
-              </a:rPr>
-              <a:t>( p == NULL ) </a:t>
-            </a:r>
-            <a:r>
-              <a:rPr lang="en-US" sz="2000" dirty="0" smtClean="0">
-                <a:latin typeface="Courier New" panose="02070309020205020404" pitchFamily="49" charset="0"/>
-                <a:cs typeface="Courier New" panose="02070309020205020404" pitchFamily="49" charset="0"/>
-              </a:rPr>
-              <a:t>{  </a:t>
-            </a:r>
-            <a:r>
-              <a:rPr lang="en-US" sz="2000" dirty="0" smtClean="0">
-                <a:latin typeface="Bodoni MT" panose="02070603080606020203" pitchFamily="18" charset="0"/>
-                <a:cs typeface="Courier New" panose="02070309020205020404" pitchFamily="49" charset="0"/>
-              </a:rPr>
-              <a:t>// delete beginning element if it exists: empty list or just one element case</a:t>
-            </a:r>
-            <a:r>
-              <a:rPr lang="en-US" sz="2000" dirty="0" smtClean="0">
-                <a:latin typeface="Courier New" panose="02070309020205020404" pitchFamily="49" charset="0"/>
-                <a:cs typeface="Courier New" panose="02070309020205020404" pitchFamily="49" charset="0"/>
-              </a:rPr>
-              <a:t/>
-            </a:r>
-            <a:br>
-              <a:rPr lang="en-US" sz="2000" dirty="0" smtClean="0">
-                <a:latin typeface="Courier New" panose="02070309020205020404" pitchFamily="49" charset="0"/>
-                <a:cs typeface="Courier New" panose="02070309020205020404" pitchFamily="49" charset="0"/>
-              </a:rPr>
-            </a:br>
-            <a:r>
-              <a:rPr lang="en-US" sz="2000" dirty="0" smtClean="0">
-                <a:latin typeface="Courier New" panose="02070309020205020404" pitchFamily="49" charset="0"/>
-                <a:cs typeface="Courier New" panose="02070309020205020404" pitchFamily="49" charset="0"/>
-              </a:rPr>
-              <a:t>   </a:t>
-            </a:r>
-            <a:r>
-              <a:rPr lang="en-US" sz="2000" dirty="0" smtClean="0">
-                <a:latin typeface="Courier New" panose="02070309020205020404" pitchFamily="49" charset="0"/>
-                <a:cs typeface="Courier New" panose="02070309020205020404" pitchFamily="49" charset="0"/>
-              </a:rPr>
-              <a:t>      </a:t>
-            </a:r>
-            <a:r>
-              <a:rPr lang="en-US" sz="2000" dirty="0" smtClean="0">
-                <a:latin typeface="Courier New" panose="02070309020205020404" pitchFamily="49" charset="0"/>
-                <a:cs typeface="Courier New" panose="02070309020205020404" pitchFamily="49" charset="0"/>
-              </a:rPr>
-              <a:t>head = head ? </a:t>
-            </a:r>
-            <a:r>
-              <a:rPr lang="en-US" sz="2000" dirty="0" smtClean="0">
-                <a:latin typeface="Courier New" panose="02070309020205020404" pitchFamily="49" charset="0"/>
-                <a:cs typeface="Courier New" panose="02070309020205020404" pitchFamily="49" charset="0"/>
-              </a:rPr>
-              <a:t>head-</a:t>
-            </a:r>
-            <a:r>
-              <a:rPr lang="en-US" sz="2000" dirty="0" smtClean="0">
-                <a:latin typeface="Courier New" panose="02070309020205020404" pitchFamily="49" charset="0"/>
-                <a:cs typeface="Courier New" panose="02070309020205020404" pitchFamily="49" charset="0"/>
-              </a:rPr>
-              <a:t>&gt;</a:t>
-            </a:r>
-            <a:r>
-              <a:rPr lang="en-US" sz="2000" dirty="0" smtClean="0">
-                <a:latin typeface="Courier New" panose="02070309020205020404" pitchFamily="49" charset="0"/>
-                <a:cs typeface="Courier New" panose="02070309020205020404" pitchFamily="49" charset="0"/>
-              </a:rPr>
-              <a:t>next: NULL;</a:t>
-            </a:r>
-            <a:r>
-              <a:rPr lang="en-US" sz="2000" dirty="0" smtClean="0">
-                <a:latin typeface="Courier New" panose="02070309020205020404" pitchFamily="49" charset="0"/>
-                <a:cs typeface="Courier New" panose="02070309020205020404" pitchFamily="49" charset="0"/>
-              </a:rPr>
-              <a:t/>
-            </a:r>
-            <a:br>
-              <a:rPr lang="en-US" sz="2000" dirty="0" smtClean="0">
-                <a:latin typeface="Courier New" panose="02070309020205020404" pitchFamily="49" charset="0"/>
-                <a:cs typeface="Courier New" panose="02070309020205020404" pitchFamily="49" charset="0"/>
-              </a:rPr>
-            </a:br>
-            <a:r>
-              <a:rPr lang="en-US" sz="2000" dirty="0" smtClean="0">
-                <a:latin typeface="Courier New" panose="02070309020205020404" pitchFamily="49" charset="0"/>
-                <a:cs typeface="Courier New" panose="02070309020205020404" pitchFamily="49" charset="0"/>
-              </a:rPr>
-              <a:t>   </a:t>
-            </a:r>
-            <a:r>
-              <a:rPr lang="en-US" sz="2000" dirty="0" smtClean="0">
-                <a:latin typeface="Courier New" panose="02070309020205020404" pitchFamily="49" charset="0"/>
-                <a:cs typeface="Courier New" panose="02070309020205020404" pitchFamily="49" charset="0"/>
-              </a:rPr>
-              <a:t>      </a:t>
-            </a:r>
-            <a:r>
-              <a:rPr lang="en-US" sz="2000" dirty="0" smtClean="0">
-                <a:latin typeface="Courier New" panose="02070309020205020404" pitchFamily="49" charset="0"/>
-                <a:cs typeface="Courier New" panose="02070309020205020404" pitchFamily="49" charset="0"/>
-              </a:rPr>
-              <a:t>if ( l ) free (l); </a:t>
-            </a:r>
-            <a:br>
-              <a:rPr lang="en-US" sz="2000" dirty="0" smtClean="0">
-                <a:latin typeface="Courier New" panose="02070309020205020404" pitchFamily="49" charset="0"/>
-                <a:cs typeface="Courier New" panose="02070309020205020404" pitchFamily="49" charset="0"/>
-              </a:rPr>
-            </a:br>
-            <a:r>
-              <a:rPr lang="en-US" sz="2000" dirty="0" smtClean="0">
-                <a:latin typeface="Courier New" panose="02070309020205020404" pitchFamily="49" charset="0"/>
-                <a:cs typeface="Courier New" panose="02070309020205020404" pitchFamily="49" charset="0"/>
-              </a:rPr>
-              <a:t>   </a:t>
-            </a:r>
-            <a:r>
-              <a:rPr lang="en-US" sz="2000" dirty="0" smtClean="0">
-                <a:latin typeface="Courier New" panose="02070309020205020404" pitchFamily="49" charset="0"/>
-                <a:cs typeface="Courier New" panose="02070309020205020404" pitchFamily="49" charset="0"/>
-              </a:rPr>
-              <a:t>      </a:t>
-            </a:r>
-            <a:r>
-              <a:rPr lang="en-US" sz="2000" dirty="0" smtClean="0">
-                <a:latin typeface="Courier New" panose="02070309020205020404" pitchFamily="49" charset="0"/>
-                <a:cs typeface="Courier New" panose="02070309020205020404" pitchFamily="49" charset="0"/>
-              </a:rPr>
-              <a:t>return head</a:t>
-            </a:r>
-            <a:r>
-              <a:rPr lang="en-US" sz="2000" dirty="0" smtClean="0">
-                <a:latin typeface="Courier New" panose="02070309020205020404" pitchFamily="49" charset="0"/>
-                <a:cs typeface="Courier New" panose="02070309020205020404" pitchFamily="49" charset="0"/>
-              </a:rPr>
-              <a:t>;     </a:t>
-            </a:r>
-            <a:r>
-              <a:rPr lang="en-US" sz="2000" dirty="0" smtClean="0">
-                <a:latin typeface="Bodoni MT" panose="02070603080606020203" pitchFamily="18" charset="0"/>
-                <a:cs typeface="Courier New" panose="02070309020205020404" pitchFamily="49" charset="0"/>
-              </a:rPr>
-              <a:t>// we’ll return a new head</a:t>
-            </a:r>
-            <a:r>
-              <a:rPr lang="en-US" sz="2000" dirty="0" smtClean="0">
-                <a:latin typeface="Courier New" panose="02070309020205020404" pitchFamily="49" charset="0"/>
-                <a:cs typeface="Courier New" panose="02070309020205020404" pitchFamily="49" charset="0"/>
-              </a:rPr>
-              <a:t/>
-            </a:r>
-            <a:br>
-              <a:rPr lang="en-US" sz="2000" dirty="0" smtClean="0">
-                <a:latin typeface="Courier New" panose="02070309020205020404" pitchFamily="49" charset="0"/>
-                <a:cs typeface="Courier New" panose="02070309020205020404" pitchFamily="49" charset="0"/>
-              </a:rPr>
-            </a:br>
-            <a:r>
-              <a:rPr lang="en-US" sz="2000" dirty="0" smtClean="0">
-                <a:latin typeface="Courier New" panose="02070309020205020404" pitchFamily="49" charset="0"/>
-                <a:cs typeface="Courier New" panose="02070309020205020404" pitchFamily="49" charset="0"/>
-              </a:rPr>
-              <a:t>   </a:t>
-            </a:r>
-            <a:r>
-              <a:rPr lang="en-US" sz="2000" dirty="0" smtClean="0">
-                <a:latin typeface="Courier New" panose="02070309020205020404" pitchFamily="49" charset="0"/>
-                <a:cs typeface="Courier New" panose="02070309020205020404" pitchFamily="49" charset="0"/>
-              </a:rPr>
-              <a:t>}</a:t>
-            </a:r>
-          </a:p>
-          <a:p>
-            <a:pPr marL="0" indent="0">
-              <a:buNone/>
-            </a:pPr>
-            <a:r>
-              <a:rPr lang="en-US" sz="2000" dirty="0">
-                <a:latin typeface="Courier New" panose="02070309020205020404" pitchFamily="49" charset="0"/>
-                <a:cs typeface="Courier New" panose="02070309020205020404" pitchFamily="49" charset="0"/>
-              </a:rPr>
-              <a:t> </a:t>
-            </a:r>
-            <a:r>
-              <a:rPr lang="en-US" sz="2000" dirty="0" smtClean="0">
-                <a:latin typeface="Courier New" panose="02070309020205020404" pitchFamily="49" charset="0"/>
-                <a:cs typeface="Courier New" panose="02070309020205020404" pitchFamily="49" charset="0"/>
-              </a:rPr>
-              <a:t>      </a:t>
-            </a:r>
-            <a:r>
-              <a:rPr lang="en-US" sz="2000" dirty="0" smtClean="0">
-                <a:latin typeface="Bodoni MT" panose="02070603080606020203" pitchFamily="18" charset="0"/>
-                <a:cs typeface="Courier New" panose="02070309020205020404" pitchFamily="49" charset="0"/>
-              </a:rPr>
-              <a:t>// Now l  points to the node to delete</a:t>
-            </a:r>
-            <a:endParaRPr lang="en-US" sz="2000" dirty="0">
-              <a:latin typeface="Bodoni MT" panose="02070603080606020203" pitchFamily="18" charset="0"/>
-              <a:cs typeface="Courier New" panose="02070309020205020404" pitchFamily="49" charset="0"/>
-            </a:endParaRPr>
-          </a:p>
-          <a:p>
-            <a:pPr marL="0" indent="0">
-              <a:buNone/>
-            </a:pPr>
-            <a:r>
-              <a:rPr lang="en-US" sz="2000" dirty="0" smtClean="0">
-                <a:latin typeface="Courier New" panose="02070309020205020404" pitchFamily="49" charset="0"/>
-                <a:cs typeface="Courier New" panose="02070309020205020404" pitchFamily="49" charset="0"/>
-              </a:rPr>
-              <a:t>   </a:t>
-            </a:r>
-            <a:r>
-              <a:rPr lang="en-US" sz="2000" dirty="0" smtClean="0">
-                <a:latin typeface="Courier New" panose="02070309020205020404" pitchFamily="49" charset="0"/>
-                <a:cs typeface="Courier New" panose="02070309020205020404" pitchFamily="49" charset="0"/>
-              </a:rPr>
-              <a:t>p-</a:t>
-            </a:r>
-            <a:r>
-              <a:rPr lang="en-US" sz="2000" dirty="0" smtClean="0">
-                <a:latin typeface="Courier New" panose="02070309020205020404" pitchFamily="49" charset="0"/>
-                <a:cs typeface="Courier New" panose="02070309020205020404" pitchFamily="49" charset="0"/>
-              </a:rPr>
-              <a:t>&gt;next= l ? l-&gt;next: NULL</a:t>
-            </a:r>
-            <a:r>
-              <a:rPr lang="en-US" sz="2000" dirty="0" smtClean="0">
-                <a:latin typeface="Courier New" panose="02070309020205020404" pitchFamily="49" charset="0"/>
-                <a:cs typeface="Courier New" panose="02070309020205020404" pitchFamily="49" charset="0"/>
-              </a:rPr>
-              <a:t>;    </a:t>
-            </a:r>
-            <a:r>
-              <a:rPr lang="en-US" sz="2000" dirty="0" smtClean="0">
-                <a:latin typeface="Bodoni MT" panose="02070603080606020203" pitchFamily="18" charset="0"/>
-                <a:cs typeface="Courier New" panose="02070309020205020404" pitchFamily="49" charset="0"/>
-              </a:rPr>
-              <a:t>// check if l is not NULL</a:t>
-            </a:r>
-            <a:r>
-              <a:rPr lang="en-US" sz="2000" dirty="0" smtClean="0">
-                <a:latin typeface="Courier New" panose="02070309020205020404" pitchFamily="49" charset="0"/>
-                <a:cs typeface="Courier New" panose="02070309020205020404" pitchFamily="49" charset="0"/>
-              </a:rPr>
-              <a:t/>
-            </a:r>
-            <a:br>
-              <a:rPr lang="en-US" sz="2000" dirty="0" smtClean="0">
-                <a:latin typeface="Courier New" panose="02070309020205020404" pitchFamily="49" charset="0"/>
-                <a:cs typeface="Courier New" panose="02070309020205020404" pitchFamily="49" charset="0"/>
-              </a:rPr>
-            </a:br>
-            <a:r>
-              <a:rPr lang="en-US" sz="2000" dirty="0" smtClean="0">
-                <a:latin typeface="Courier New" panose="02070309020205020404" pitchFamily="49" charset="0"/>
-                <a:cs typeface="Courier New" panose="02070309020205020404" pitchFamily="49" charset="0"/>
-              </a:rPr>
-              <a:t>   </a:t>
-            </a:r>
-            <a:r>
-              <a:rPr lang="en-US" sz="2000" dirty="0" smtClean="0">
-                <a:latin typeface="Courier New" panose="02070309020205020404" pitchFamily="49" charset="0"/>
-                <a:cs typeface="Courier New" panose="02070309020205020404" pitchFamily="49" charset="0"/>
-              </a:rPr>
-              <a:t>if </a:t>
-            </a:r>
-            <a:r>
-              <a:rPr lang="en-US" sz="2000" dirty="0" smtClean="0">
-                <a:latin typeface="Courier New" panose="02070309020205020404" pitchFamily="49" charset="0"/>
-                <a:cs typeface="Courier New" panose="02070309020205020404" pitchFamily="49" charset="0"/>
-              </a:rPr>
-              <a:t>( l ) free(l</a:t>
-            </a:r>
-            <a:r>
-              <a:rPr lang="en-US" sz="2000" dirty="0" smtClean="0">
-                <a:latin typeface="Courier New" panose="02070309020205020404" pitchFamily="49" charset="0"/>
-                <a:cs typeface="Courier New" panose="02070309020205020404" pitchFamily="49" charset="0"/>
-              </a:rPr>
-              <a:t>); </a:t>
-            </a:r>
-            <a:r>
-              <a:rPr lang="en-US" sz="2000" dirty="0" smtClean="0">
-                <a:latin typeface="Bodoni MT" panose="02070603080606020203" pitchFamily="18" charset="0"/>
-                <a:cs typeface="Courier New" panose="02070309020205020404" pitchFamily="49" charset="0"/>
-              </a:rPr>
-              <a:t>  // since we will no longer use this node in this example</a:t>
-            </a:r>
-            <a:r>
-              <a:rPr lang="en-US" sz="2000" dirty="0" smtClean="0">
-                <a:latin typeface="Courier New" panose="02070309020205020404" pitchFamily="49" charset="0"/>
-                <a:cs typeface="Courier New" panose="02070309020205020404" pitchFamily="49" charset="0"/>
-              </a:rPr>
-              <a:t/>
-            </a:r>
-            <a:br>
-              <a:rPr lang="en-US" sz="2000" dirty="0" smtClean="0">
-                <a:latin typeface="Courier New" panose="02070309020205020404" pitchFamily="49" charset="0"/>
-                <a:cs typeface="Courier New" panose="02070309020205020404" pitchFamily="49" charset="0"/>
-              </a:rPr>
-            </a:br>
-            <a:r>
-              <a:rPr lang="en-US" sz="2000" dirty="0" smtClean="0">
-                <a:latin typeface="Courier New" panose="02070309020205020404" pitchFamily="49" charset="0"/>
-                <a:cs typeface="Courier New" panose="02070309020205020404" pitchFamily="49" charset="0"/>
-              </a:rPr>
-              <a:t>   </a:t>
-            </a:r>
-            <a:r>
-              <a:rPr lang="en-US" sz="2000" dirty="0" smtClean="0">
-                <a:latin typeface="Courier New" panose="02070309020205020404" pitchFamily="49" charset="0"/>
-                <a:cs typeface="Courier New" panose="02070309020205020404" pitchFamily="49" charset="0"/>
-              </a:rPr>
-              <a:t>return </a:t>
-            </a:r>
-            <a:r>
-              <a:rPr lang="en-US" sz="2000" dirty="0">
-                <a:latin typeface="Courier New" panose="02070309020205020404" pitchFamily="49" charset="0"/>
-                <a:cs typeface="Courier New" panose="02070309020205020404" pitchFamily="49" charset="0"/>
-              </a:rPr>
-              <a:t>head</a:t>
-            </a:r>
-            <a:r>
-              <a:rPr lang="en-US" sz="2000" dirty="0" smtClean="0">
-                <a:latin typeface="Courier New" panose="02070309020205020404" pitchFamily="49" charset="0"/>
-                <a:cs typeface="Courier New" panose="02070309020205020404" pitchFamily="49" charset="0"/>
-              </a:rPr>
-              <a:t>;       </a:t>
-            </a:r>
-            <a:r>
-              <a:rPr lang="en-US" sz="2000" dirty="0" smtClean="0">
-                <a:latin typeface="Bodoni MT" panose="02070603080606020203" pitchFamily="18" charset="0"/>
-                <a:cs typeface="Courier New" panose="02070309020205020404" pitchFamily="49" charset="0"/>
-              </a:rPr>
-              <a:t>// …  and return the old head</a:t>
-            </a:r>
-            <a:endParaRPr lang="en-US" sz="2000" dirty="0">
-              <a:latin typeface="Bodoni MT" panose="02070603080606020203" pitchFamily="18" charset="0"/>
-              <a:cs typeface="Courier New" panose="02070309020205020404" pitchFamily="49" charset="0"/>
-            </a:endParaRPr>
-          </a:p>
-          <a:p>
-            <a:pPr marL="0" indent="0">
-              <a:buNone/>
-            </a:pPr>
-            <a:r>
-              <a:rPr lang="en-US" sz="2000" dirty="0">
+              <a:rPr lang="en-US" sz="2200" dirty="0">
                 <a:latin typeface="Courier New" panose="02070309020205020404" pitchFamily="49" charset="0"/>
                 <a:cs typeface="Courier New" panose="02070309020205020404" pitchFamily="49" charset="0"/>
               </a:rPr>
@@ -17337,7 +17263,7 @@
     </p:spTree>
     <p:extLst>
       <p:ext uri="{BB962C8B-B14F-4D97-AF65-F5344CB8AC3E}">
-        <p14:creationId xmlns:p14="http://schemas.microsoft.com/office/powerpoint/2010/main" val="1599455929"/>
+        <p14:creationId xmlns:p14="http://schemas.microsoft.com/office/powerpoint/2010/main" val="1510937364"/>
       </p:ext>
     </p:extLst>
   </p:cSld>

</xml_diff>